<commit_message>
Refactor celestial object configurations and enhance zodiac sign calculations
</commit_message>
<xml_diff>
--- a/birth-sky.pptx
+++ b/birth-sky.pptx
@@ -7,6 +7,7 @@
   <p:sldIdLst>
     <p:sldId id="256" r:id="rId2"/>
     <p:sldId id="257" r:id="rId3"/>
+    <p:sldId id="258" r:id="rId4"/>
   </p:sldIdLst>
   <p:sldSz cx="12192000" cy="6858000"/>
   <p:notesSz cx="6858000" cy="9144000"/>
@@ -105,13 +106,18 @@
       </a:defRPr>
     </a:lvl9pPr>
   </p:defaultTextStyle>
+  <p:extLst>
+    <p:ext uri="{EFAFB233-063F-42B5-8137-9DF3F51BA10A}">
+      <p15:sldGuideLst xmlns:p15="http://schemas.microsoft.com/office/powerpoint/2012/main"/>
+    </p:ext>
+  </p:extLst>
 </p:presentation>
 </file>
 
 <file path=ppt/revisionInfo.xml><?xml version="1.0" encoding="utf-8"?>
 <p1510:revInfo xmlns:a="http://schemas.openxmlformats.org/drawingml/2006/main" xmlns:r="http://schemas.openxmlformats.org/officeDocument/2006/relationships" xmlns:p1510="http://schemas.microsoft.com/office/powerpoint/2015/10/main">
   <p1510:revLst>
-    <p1510:client id="{2E93C782-0E14-416A-B059-B82164B74B38}" v="38" dt="2025-04-07T18:46:43.080"/>
+    <p1510:client id="{2E93C782-0E14-416A-B059-B82164B74B38}" v="49" dt="2025-04-15T19:52:48.428"/>
   </p1510:revLst>
 </p1510:revInfo>
 </file>
@@ -121,7 +127,7 @@
   <pc:docChgLst>
     <pc:chgData name="Ned Gulley" userId="3cc63692-f2ac-4e23-b89f-2e6558fa7b42" providerId="ADAL" clId="{2E93C782-0E14-416A-B059-B82164B74B38}"/>
     <pc:docChg chg="undo custSel addSld modSld">
-      <pc:chgData name="Ned Gulley" userId="3cc63692-f2ac-4e23-b89f-2e6558fa7b42" providerId="ADAL" clId="{2E93C782-0E14-416A-B059-B82164B74B38}" dt="2025-04-07T18:54:49.767" v="876" actId="207"/>
+      <pc:chgData name="Ned Gulley" userId="3cc63692-f2ac-4e23-b89f-2e6558fa7b42" providerId="ADAL" clId="{2E93C782-0E14-416A-B059-B82164B74B38}" dt="2025-04-15T19:53:59.328" v="911"/>
       <pc:docMkLst>
         <pc:docMk/>
       </pc:docMkLst>
@@ -530,14 +536,6 @@
             <ac:spMk id="53" creationId="{8C8CF3D7-1C5E-C549-001F-3D58FFC0F2A2}"/>
           </ac:spMkLst>
         </pc:spChg>
-        <pc:spChg chg="add del mod">
-          <ac:chgData name="Ned Gulley" userId="3cc63692-f2ac-4e23-b89f-2e6558fa7b42" providerId="ADAL" clId="{2E93C782-0E14-416A-B059-B82164B74B38}" dt="2025-04-07T18:40:15.614" v="268" actId="478"/>
-          <ac:spMkLst>
-            <pc:docMk/>
-            <pc:sldMk cId="1183880799" sldId="257"/>
-            <ac:spMk id="54" creationId="{6484D93A-E980-489A-DDB0-092A69923A82}"/>
-          </ac:spMkLst>
-        </pc:spChg>
         <pc:spChg chg="add mod">
           <ac:chgData name="Ned Gulley" userId="3cc63692-f2ac-4e23-b89f-2e6558fa7b42" providerId="ADAL" clId="{2E93C782-0E14-416A-B059-B82164B74B38}" dt="2025-04-07T18:46:59.526" v="827" actId="1076"/>
           <ac:spMkLst>
@@ -546,14 +544,6 @@
             <ac:spMk id="55" creationId="{70498D5A-5563-4B2E-4044-421063260B0C}"/>
           </ac:spMkLst>
         </pc:spChg>
-        <pc:picChg chg="del">
-          <ac:chgData name="Ned Gulley" userId="3cc63692-f2ac-4e23-b89f-2e6558fa7b42" providerId="ADAL" clId="{2E93C782-0E14-416A-B059-B82164B74B38}" dt="2025-04-07T18:29:20.867" v="35" actId="21"/>
-          <ac:picMkLst>
-            <pc:docMk/>
-            <pc:sldMk cId="1183880799" sldId="257"/>
-            <ac:picMk id="5" creationId="{1E2D28C9-3F04-9D99-AA61-661A0DA9495D}"/>
-          </ac:picMkLst>
-        </pc:picChg>
         <pc:cxnChg chg="mod">
           <ac:chgData name="Ned Gulley" userId="3cc63692-f2ac-4e23-b89f-2e6558fa7b42" providerId="ADAL" clId="{2E93C782-0E14-416A-B059-B82164B74B38}" dt="2025-04-07T18:47:48.843" v="836" actId="1037"/>
           <ac:cxnSpMkLst>
@@ -570,6 +560,293 @@
             <ac:cxnSpMk id="39" creationId="{D1482253-2698-D314-BB75-144A0B5C65D0}"/>
           </ac:cxnSpMkLst>
         </pc:cxnChg>
+      </pc:sldChg>
+      <pc:sldChg chg="addSp delSp modSp add mod">
+        <pc:chgData name="Ned Gulley" userId="3cc63692-f2ac-4e23-b89f-2e6558fa7b42" providerId="ADAL" clId="{2E93C782-0E14-416A-B059-B82164B74B38}" dt="2025-04-15T19:53:59.328" v="911"/>
+        <pc:sldMkLst>
+          <pc:docMk/>
+          <pc:sldMk cId="2371161536" sldId="258"/>
+        </pc:sldMkLst>
+        <pc:spChg chg="del">
+          <ac:chgData name="Ned Gulley" userId="3cc63692-f2ac-4e23-b89f-2e6558fa7b42" providerId="ADAL" clId="{2E93C782-0E14-416A-B059-B82164B74B38}" dt="2025-04-15T19:50:25.469" v="880" actId="478"/>
+          <ac:spMkLst>
+            <pc:docMk/>
+            <pc:sldMk cId="2371161536" sldId="258"/>
+            <ac:spMk id="2" creationId="{E5E35CCC-AA34-8882-D9A9-499851FD3B01}"/>
+          </ac:spMkLst>
+        </pc:spChg>
+        <pc:spChg chg="del">
+          <ac:chgData name="Ned Gulley" userId="3cc63692-f2ac-4e23-b89f-2e6558fa7b42" providerId="ADAL" clId="{2E93C782-0E14-416A-B059-B82164B74B38}" dt="2025-04-15T19:50:21.006" v="879" actId="478"/>
+          <ac:spMkLst>
+            <pc:docMk/>
+            <pc:sldMk cId="2371161536" sldId="258"/>
+            <ac:spMk id="3" creationId="{C75223EB-24E9-21B6-009C-9FF0EEEFB4F8}"/>
+          </ac:spMkLst>
+        </pc:spChg>
+        <pc:spChg chg="del">
+          <ac:chgData name="Ned Gulley" userId="3cc63692-f2ac-4e23-b89f-2e6558fa7b42" providerId="ADAL" clId="{2E93C782-0E14-416A-B059-B82164B74B38}" dt="2025-04-15T19:50:21.006" v="879" actId="478"/>
+          <ac:spMkLst>
+            <pc:docMk/>
+            <pc:sldMk cId="2371161536" sldId="258"/>
+            <ac:spMk id="4" creationId="{A8C2A096-47F8-685A-6EED-4F86DC60DAFC}"/>
+          </ac:spMkLst>
+        </pc:spChg>
+        <pc:spChg chg="del">
+          <ac:chgData name="Ned Gulley" userId="3cc63692-f2ac-4e23-b89f-2e6558fa7b42" providerId="ADAL" clId="{2E93C782-0E14-416A-B059-B82164B74B38}" dt="2025-04-15T19:50:48.116" v="891" actId="478"/>
+          <ac:spMkLst>
+            <pc:docMk/>
+            <pc:sldMk cId="2371161536" sldId="258"/>
+            <ac:spMk id="7" creationId="{51D9561D-77AF-552C-B318-D66F3FCE9529}"/>
+          </ac:spMkLst>
+        </pc:spChg>
+        <pc:spChg chg="del">
+          <ac:chgData name="Ned Gulley" userId="3cc63692-f2ac-4e23-b89f-2e6558fa7b42" providerId="ADAL" clId="{2E93C782-0E14-416A-B059-B82164B74B38}" dt="2025-04-15T19:50:36.636" v="885" actId="478"/>
+          <ac:spMkLst>
+            <pc:docMk/>
+            <pc:sldMk cId="2371161536" sldId="258"/>
+            <ac:spMk id="9" creationId="{41C32AAD-AB76-5916-1A9C-6150ED4E19BB}"/>
+          </ac:spMkLst>
+        </pc:spChg>
+        <pc:spChg chg="del">
+          <ac:chgData name="Ned Gulley" userId="3cc63692-f2ac-4e23-b89f-2e6558fa7b42" providerId="ADAL" clId="{2E93C782-0E14-416A-B059-B82164B74B38}" dt="2025-04-15T19:50:25.469" v="880" actId="478"/>
+          <ac:spMkLst>
+            <pc:docMk/>
+            <pc:sldMk cId="2371161536" sldId="258"/>
+            <ac:spMk id="12" creationId="{18D51B7A-A44B-2DCF-7AEC-9FA6C07696A8}"/>
+          </ac:spMkLst>
+        </pc:spChg>
+        <pc:spChg chg="del">
+          <ac:chgData name="Ned Gulley" userId="3cc63692-f2ac-4e23-b89f-2e6558fa7b42" providerId="ADAL" clId="{2E93C782-0E14-416A-B059-B82164B74B38}" dt="2025-04-15T19:50:21.006" v="879" actId="478"/>
+          <ac:spMkLst>
+            <pc:docMk/>
+            <pc:sldMk cId="2371161536" sldId="258"/>
+            <ac:spMk id="14" creationId="{EF08411A-F0E7-A927-280E-4C6780680AF6}"/>
+          </ac:spMkLst>
+        </pc:spChg>
+        <pc:spChg chg="del">
+          <ac:chgData name="Ned Gulley" userId="3cc63692-f2ac-4e23-b89f-2e6558fa7b42" providerId="ADAL" clId="{2E93C782-0E14-416A-B059-B82164B74B38}" dt="2025-04-15T19:50:38.973" v="886" actId="478"/>
+          <ac:spMkLst>
+            <pc:docMk/>
+            <pc:sldMk cId="2371161536" sldId="258"/>
+            <ac:spMk id="16" creationId="{1D50F4E7-DF47-2964-4810-318619461C32}"/>
+          </ac:spMkLst>
+        </pc:spChg>
+        <pc:spChg chg="del mod">
+          <ac:chgData name="Ned Gulley" userId="3cc63692-f2ac-4e23-b89f-2e6558fa7b42" providerId="ADAL" clId="{2E93C782-0E14-416A-B059-B82164B74B38}" dt="2025-04-15T19:50:42.452" v="888" actId="478"/>
+          <ac:spMkLst>
+            <pc:docMk/>
+            <pc:sldMk cId="2371161536" sldId="258"/>
+            <ac:spMk id="18" creationId="{DE300831-6FDB-F88C-FCB4-2D45F447883B}"/>
+          </ac:spMkLst>
+        </pc:spChg>
+        <pc:spChg chg="del">
+          <ac:chgData name="Ned Gulley" userId="3cc63692-f2ac-4e23-b89f-2e6558fa7b42" providerId="ADAL" clId="{2E93C782-0E14-416A-B059-B82164B74B38}" dt="2025-04-15T19:50:46.885" v="890" actId="478"/>
+          <ac:spMkLst>
+            <pc:docMk/>
+            <pc:sldMk cId="2371161536" sldId="258"/>
+            <ac:spMk id="21" creationId="{AF626BC1-968A-DDD1-6153-1D7507F42B3C}"/>
+          </ac:spMkLst>
+        </pc:spChg>
+        <pc:spChg chg="del">
+          <ac:chgData name="Ned Gulley" userId="3cc63692-f2ac-4e23-b89f-2e6558fa7b42" providerId="ADAL" clId="{2E93C782-0E14-416A-B059-B82164B74B38}" dt="2025-04-15T19:50:25.469" v="880" actId="478"/>
+          <ac:spMkLst>
+            <pc:docMk/>
+            <pc:sldMk cId="2371161536" sldId="258"/>
+            <ac:spMk id="22" creationId="{C141469C-2638-4CC3-7014-FEE0C850933E}"/>
+          </ac:spMkLst>
+        </pc:spChg>
+        <pc:spChg chg="del">
+          <ac:chgData name="Ned Gulley" userId="3cc63692-f2ac-4e23-b89f-2e6558fa7b42" providerId="ADAL" clId="{2E93C782-0E14-416A-B059-B82164B74B38}" dt="2025-04-15T19:50:36.636" v="885" actId="478"/>
+          <ac:spMkLst>
+            <pc:docMk/>
+            <pc:sldMk cId="2371161536" sldId="258"/>
+            <ac:spMk id="32" creationId="{351CF2EB-08C4-3472-0A7B-A3D4992DDD95}"/>
+          </ac:spMkLst>
+        </pc:spChg>
+        <pc:spChg chg="del mod">
+          <ac:chgData name="Ned Gulley" userId="3cc63692-f2ac-4e23-b89f-2e6558fa7b42" providerId="ADAL" clId="{2E93C782-0E14-416A-B059-B82164B74B38}" dt="2025-04-15T19:50:30.116" v="883" actId="478"/>
+          <ac:spMkLst>
+            <pc:docMk/>
+            <pc:sldMk cId="2371161536" sldId="258"/>
+            <ac:spMk id="44" creationId="{9AF8CC78-982F-BF33-D929-2C3C98BE119F}"/>
+          </ac:spMkLst>
+        </pc:spChg>
+        <pc:spChg chg="del mod">
+          <ac:chgData name="Ned Gulley" userId="3cc63692-f2ac-4e23-b89f-2e6558fa7b42" providerId="ADAL" clId="{2E93C782-0E14-416A-B059-B82164B74B38}" dt="2025-04-15T19:50:21.006" v="879" actId="478"/>
+          <ac:spMkLst>
+            <pc:docMk/>
+            <pc:sldMk cId="2371161536" sldId="258"/>
+            <ac:spMk id="45" creationId="{FC6EE579-6A63-1152-7541-7A29939F00F2}"/>
+          </ac:spMkLst>
+        </pc:spChg>
+        <pc:spChg chg="del">
+          <ac:chgData name="Ned Gulley" userId="3cc63692-f2ac-4e23-b89f-2e6558fa7b42" providerId="ADAL" clId="{2E93C782-0E14-416A-B059-B82164B74B38}" dt="2025-04-15T19:50:27.362" v="881" actId="478"/>
+          <ac:spMkLst>
+            <pc:docMk/>
+            <pc:sldMk cId="2371161536" sldId="258"/>
+            <ac:spMk id="46" creationId="{A420D15E-72F6-0083-6896-70B1962C8A53}"/>
+          </ac:spMkLst>
+        </pc:spChg>
+        <pc:spChg chg="del">
+          <ac:chgData name="Ned Gulley" userId="3cc63692-f2ac-4e23-b89f-2e6558fa7b42" providerId="ADAL" clId="{2E93C782-0E14-416A-B059-B82164B74B38}" dt="2025-04-15T19:50:32.396" v="884" actId="478"/>
+          <ac:spMkLst>
+            <pc:docMk/>
+            <pc:sldMk cId="2371161536" sldId="258"/>
+            <ac:spMk id="47" creationId="{197B59E3-9776-FED3-A23E-80F0EAC50C9B}"/>
+          </ac:spMkLst>
+        </pc:spChg>
+        <pc:spChg chg="del">
+          <ac:chgData name="Ned Gulley" userId="3cc63692-f2ac-4e23-b89f-2e6558fa7b42" providerId="ADAL" clId="{2E93C782-0E14-416A-B059-B82164B74B38}" dt="2025-04-15T19:50:32.396" v="884" actId="478"/>
+          <ac:spMkLst>
+            <pc:docMk/>
+            <pc:sldMk cId="2371161536" sldId="258"/>
+            <ac:spMk id="48" creationId="{A98673E3-8C18-760F-C2B7-2D5AED2C35E0}"/>
+          </ac:spMkLst>
+        </pc:spChg>
+        <pc:spChg chg="del">
+          <ac:chgData name="Ned Gulley" userId="3cc63692-f2ac-4e23-b89f-2e6558fa7b42" providerId="ADAL" clId="{2E93C782-0E14-416A-B059-B82164B74B38}" dt="2025-04-15T19:50:36.636" v="885" actId="478"/>
+          <ac:spMkLst>
+            <pc:docMk/>
+            <pc:sldMk cId="2371161536" sldId="258"/>
+            <ac:spMk id="49" creationId="{71A3CDAF-C4C6-2F26-08E9-BC6928D4FF4C}"/>
+          </ac:spMkLst>
+        </pc:spChg>
+        <pc:spChg chg="del">
+          <ac:chgData name="Ned Gulley" userId="3cc63692-f2ac-4e23-b89f-2e6558fa7b42" providerId="ADAL" clId="{2E93C782-0E14-416A-B059-B82164B74B38}" dt="2025-04-15T19:50:36.636" v="885" actId="478"/>
+          <ac:spMkLst>
+            <pc:docMk/>
+            <pc:sldMk cId="2371161536" sldId="258"/>
+            <ac:spMk id="50" creationId="{777FFC24-02D5-CE56-4BB0-DD6478217D64}"/>
+          </ac:spMkLst>
+        </pc:spChg>
+        <pc:spChg chg="del">
+          <ac:chgData name="Ned Gulley" userId="3cc63692-f2ac-4e23-b89f-2e6558fa7b42" providerId="ADAL" clId="{2E93C782-0E14-416A-B059-B82164B74B38}" dt="2025-04-15T19:50:45.813" v="889" actId="478"/>
+          <ac:spMkLst>
+            <pc:docMk/>
+            <pc:sldMk cId="2371161536" sldId="258"/>
+            <ac:spMk id="51" creationId="{6F70B93D-B5C7-E187-D29E-7220F1D90D59}"/>
+          </ac:spMkLst>
+        </pc:spChg>
+        <pc:spChg chg="del">
+          <ac:chgData name="Ned Gulley" userId="3cc63692-f2ac-4e23-b89f-2e6558fa7b42" providerId="ADAL" clId="{2E93C782-0E14-416A-B059-B82164B74B38}" dt="2025-04-15T19:50:25.469" v="880" actId="478"/>
+          <ac:spMkLst>
+            <pc:docMk/>
+            <pc:sldMk cId="2371161536" sldId="258"/>
+            <ac:spMk id="52" creationId="{AFD1C8E0-127B-18DB-9B33-61AEBA4A98E2}"/>
+          </ac:spMkLst>
+        </pc:spChg>
+        <pc:spChg chg="del">
+          <ac:chgData name="Ned Gulley" userId="3cc63692-f2ac-4e23-b89f-2e6558fa7b42" providerId="ADAL" clId="{2E93C782-0E14-416A-B059-B82164B74B38}" dt="2025-04-15T19:50:25.469" v="880" actId="478"/>
+          <ac:spMkLst>
+            <pc:docMk/>
+            <pc:sldMk cId="2371161536" sldId="258"/>
+            <ac:spMk id="53" creationId="{D6302E32-AB64-3F46-10D1-E8234708B0B7}"/>
+          </ac:spMkLst>
+        </pc:spChg>
+        <pc:spChg chg="add mod">
+          <ac:chgData name="Ned Gulley" userId="3cc63692-f2ac-4e23-b89f-2e6558fa7b42" providerId="ADAL" clId="{2E93C782-0E14-416A-B059-B82164B74B38}" dt="2025-04-15T19:52:02.938" v="896" actId="1076"/>
+          <ac:spMkLst>
+            <pc:docMk/>
+            <pc:sldMk cId="2371161536" sldId="258"/>
+            <ac:spMk id="54" creationId="{3E54B227-5093-E486-AE57-90526636EB1C}"/>
+          </ac:spMkLst>
+        </pc:spChg>
+        <pc:spChg chg="del">
+          <ac:chgData name="Ned Gulley" userId="3cc63692-f2ac-4e23-b89f-2e6558fa7b42" providerId="ADAL" clId="{2E93C782-0E14-416A-B059-B82164B74B38}" dt="2025-04-15T19:50:27.362" v="881" actId="478"/>
+          <ac:spMkLst>
+            <pc:docMk/>
+            <pc:sldMk cId="2371161536" sldId="258"/>
+            <ac:spMk id="55" creationId="{B8EDCAA7-D3C5-575D-5FAE-4ABE60FE6EA9}"/>
+          </ac:spMkLst>
+        </pc:spChg>
+        <pc:spChg chg="add mod">
+          <ac:chgData name="Ned Gulley" userId="3cc63692-f2ac-4e23-b89f-2e6558fa7b42" providerId="ADAL" clId="{2E93C782-0E14-416A-B059-B82164B74B38}" dt="2025-04-15T19:52:08.526" v="897" actId="571"/>
+          <ac:spMkLst>
+            <pc:docMk/>
+            <pc:sldMk cId="2371161536" sldId="258"/>
+            <ac:spMk id="56" creationId="{E35BAC3C-98A9-2D97-49D2-A9CBAB9174F2}"/>
+          </ac:spMkLst>
+        </pc:spChg>
+        <pc:spChg chg="add mod">
+          <ac:chgData name="Ned Gulley" userId="3cc63692-f2ac-4e23-b89f-2e6558fa7b42" providerId="ADAL" clId="{2E93C782-0E14-416A-B059-B82164B74B38}" dt="2025-04-15T19:52:11.593" v="898" actId="571"/>
+          <ac:spMkLst>
+            <pc:docMk/>
+            <pc:sldMk cId="2371161536" sldId="258"/>
+            <ac:spMk id="57" creationId="{8737C7EA-214F-0ADF-07BF-46D77F5931AD}"/>
+          </ac:spMkLst>
+        </pc:spChg>
+        <pc:spChg chg="add mod">
+          <ac:chgData name="Ned Gulley" userId="3cc63692-f2ac-4e23-b89f-2e6558fa7b42" providerId="ADAL" clId="{2E93C782-0E14-416A-B059-B82164B74B38}" dt="2025-04-15T19:53:59.328" v="911"/>
+          <ac:spMkLst>
+            <pc:docMk/>
+            <pc:sldMk cId="2371161536" sldId="258"/>
+            <ac:spMk id="58" creationId="{0CB99A24-5DBD-306C-D783-E3A237D82484}"/>
+          </ac:spMkLst>
+        </pc:spChg>
+        <pc:spChg chg="add mod">
+          <ac:chgData name="Ned Gulley" userId="3cc63692-f2ac-4e23-b89f-2e6558fa7b42" providerId="ADAL" clId="{2E93C782-0E14-416A-B059-B82164B74B38}" dt="2025-04-15T19:52:29.236" v="900" actId="571"/>
+          <ac:spMkLst>
+            <pc:docMk/>
+            <pc:sldMk cId="2371161536" sldId="258"/>
+            <ac:spMk id="59" creationId="{AD9917BB-A0A9-0A20-5837-D83FA51C7AF4}"/>
+          </ac:spMkLst>
+        </pc:spChg>
+        <pc:spChg chg="add mod">
+          <ac:chgData name="Ned Gulley" userId="3cc63692-f2ac-4e23-b89f-2e6558fa7b42" providerId="ADAL" clId="{2E93C782-0E14-416A-B059-B82164B74B38}" dt="2025-04-15T19:52:34.681" v="901" actId="571"/>
+          <ac:spMkLst>
+            <pc:docMk/>
+            <pc:sldMk cId="2371161536" sldId="258"/>
+            <ac:spMk id="60" creationId="{7E2886ED-008E-DC5C-79E3-EBB8933F5190}"/>
+          </ac:spMkLst>
+        </pc:spChg>
+        <pc:spChg chg="add mod">
+          <ac:chgData name="Ned Gulley" userId="3cc63692-f2ac-4e23-b89f-2e6558fa7b42" providerId="ADAL" clId="{2E93C782-0E14-416A-B059-B82164B74B38}" dt="2025-04-15T19:52:37.862" v="902" actId="571"/>
+          <ac:spMkLst>
+            <pc:docMk/>
+            <pc:sldMk cId="2371161536" sldId="258"/>
+            <ac:spMk id="61" creationId="{1D5E312F-4FB1-9083-CA63-8FBF1172C840}"/>
+          </ac:spMkLst>
+        </pc:spChg>
+        <pc:spChg chg="add mod">
+          <ac:chgData name="Ned Gulley" userId="3cc63692-f2ac-4e23-b89f-2e6558fa7b42" providerId="ADAL" clId="{2E93C782-0E14-416A-B059-B82164B74B38}" dt="2025-04-15T19:52:40.345" v="903" actId="571"/>
+          <ac:spMkLst>
+            <pc:docMk/>
+            <pc:sldMk cId="2371161536" sldId="258"/>
+            <ac:spMk id="62" creationId="{9DF1CB20-9788-B518-865E-C2C171A4CD17}"/>
+          </ac:spMkLst>
+        </pc:spChg>
+        <pc:spChg chg="add mod">
+          <ac:chgData name="Ned Gulley" userId="3cc63692-f2ac-4e23-b89f-2e6558fa7b42" providerId="ADAL" clId="{2E93C782-0E14-416A-B059-B82164B74B38}" dt="2025-04-15T19:52:42.186" v="904" actId="571"/>
+          <ac:spMkLst>
+            <pc:docMk/>
+            <pc:sldMk cId="2371161536" sldId="258"/>
+            <ac:spMk id="63" creationId="{FDEB8276-ABF5-C92E-B0C6-851C12FBA4D8}"/>
+          </ac:spMkLst>
+        </pc:spChg>
+        <pc:spChg chg="add mod">
+          <ac:chgData name="Ned Gulley" userId="3cc63692-f2ac-4e23-b89f-2e6558fa7b42" providerId="ADAL" clId="{2E93C782-0E14-416A-B059-B82164B74B38}" dt="2025-04-15T19:52:43.681" v="905" actId="571"/>
+          <ac:spMkLst>
+            <pc:docMk/>
+            <pc:sldMk cId="2371161536" sldId="258"/>
+            <ac:spMk id="64" creationId="{DBE01BD7-37D6-68C0-09C6-0E7DFE72563C}"/>
+          </ac:spMkLst>
+        </pc:spChg>
+        <pc:spChg chg="add mod">
+          <ac:chgData name="Ned Gulley" userId="3cc63692-f2ac-4e23-b89f-2e6558fa7b42" providerId="ADAL" clId="{2E93C782-0E14-416A-B059-B82164B74B38}" dt="2025-04-15T19:52:45.128" v="906" actId="571"/>
+          <ac:spMkLst>
+            <pc:docMk/>
+            <pc:sldMk cId="2371161536" sldId="258"/>
+            <ac:spMk id="65" creationId="{EB8076F4-1DDC-2CA1-74D0-5277D9346655}"/>
+          </ac:spMkLst>
+        </pc:spChg>
+        <pc:spChg chg="add mod">
+          <ac:chgData name="Ned Gulley" userId="3cc63692-f2ac-4e23-b89f-2e6558fa7b42" providerId="ADAL" clId="{2E93C782-0E14-416A-B059-B82164B74B38}" dt="2025-04-15T19:52:48.427" v="907" actId="571"/>
+          <ac:spMkLst>
+            <pc:docMk/>
+            <pc:sldMk cId="2371161536" sldId="258"/>
+            <ac:spMk id="66" creationId="{40D80BAA-7286-3C25-26E6-05AFAB59D052}"/>
+          </ac:spMkLst>
+        </pc:spChg>
       </pc:sldChg>
     </pc:docChg>
   </pc:docChgLst>
@@ -723,7 +1000,7 @@
           <a:p>
             <a:fld id="{EE606AEF-1D4D-4006-A373-63B33284AF0C}" type="datetimeFigureOut">
               <a:rPr lang="en-US" smtClean="0"/>
-              <a:t>4/7/2025</a:t>
+              <a:t>4/15/2025</a:t>
             </a:fld>
             <a:endParaRPr lang="en-US"/>
           </a:p>
@@ -921,7 +1198,7 @@
           <a:p>
             <a:fld id="{EE606AEF-1D4D-4006-A373-63B33284AF0C}" type="datetimeFigureOut">
               <a:rPr lang="en-US" smtClean="0"/>
-              <a:t>4/7/2025</a:t>
+              <a:t>4/15/2025</a:t>
             </a:fld>
             <a:endParaRPr lang="en-US"/>
           </a:p>
@@ -1129,7 +1406,7 @@
           <a:p>
             <a:fld id="{EE606AEF-1D4D-4006-A373-63B33284AF0C}" type="datetimeFigureOut">
               <a:rPr lang="en-US" smtClean="0"/>
-              <a:t>4/7/2025</a:t>
+              <a:t>4/15/2025</a:t>
             </a:fld>
             <a:endParaRPr lang="en-US"/>
           </a:p>
@@ -1327,7 +1604,7 @@
           <a:p>
             <a:fld id="{EE606AEF-1D4D-4006-A373-63B33284AF0C}" type="datetimeFigureOut">
               <a:rPr lang="en-US" smtClean="0"/>
-              <a:t>4/7/2025</a:t>
+              <a:t>4/15/2025</a:t>
             </a:fld>
             <a:endParaRPr lang="en-US"/>
           </a:p>
@@ -1602,7 +1879,7 @@
           <a:p>
             <a:fld id="{EE606AEF-1D4D-4006-A373-63B33284AF0C}" type="datetimeFigureOut">
               <a:rPr lang="en-US" smtClean="0"/>
-              <a:t>4/7/2025</a:t>
+              <a:t>4/15/2025</a:t>
             </a:fld>
             <a:endParaRPr lang="en-US"/>
           </a:p>
@@ -1867,7 +2144,7 @@
           <a:p>
             <a:fld id="{EE606AEF-1D4D-4006-A373-63B33284AF0C}" type="datetimeFigureOut">
               <a:rPr lang="en-US" smtClean="0"/>
-              <a:t>4/7/2025</a:t>
+              <a:t>4/15/2025</a:t>
             </a:fld>
             <a:endParaRPr lang="en-US"/>
           </a:p>
@@ -2279,7 +2556,7 @@
           <a:p>
             <a:fld id="{EE606AEF-1D4D-4006-A373-63B33284AF0C}" type="datetimeFigureOut">
               <a:rPr lang="en-US" smtClean="0"/>
-              <a:t>4/7/2025</a:t>
+              <a:t>4/15/2025</a:t>
             </a:fld>
             <a:endParaRPr lang="en-US"/>
           </a:p>
@@ -2420,7 +2697,7 @@
           <a:p>
             <a:fld id="{EE606AEF-1D4D-4006-A373-63B33284AF0C}" type="datetimeFigureOut">
               <a:rPr lang="en-US" smtClean="0"/>
-              <a:t>4/7/2025</a:t>
+              <a:t>4/15/2025</a:t>
             </a:fld>
             <a:endParaRPr lang="en-US"/>
           </a:p>
@@ -2533,7 +2810,7 @@
           <a:p>
             <a:fld id="{EE606AEF-1D4D-4006-A373-63B33284AF0C}" type="datetimeFigureOut">
               <a:rPr lang="en-US" smtClean="0"/>
-              <a:t>4/7/2025</a:t>
+              <a:t>4/15/2025</a:t>
             </a:fld>
             <a:endParaRPr lang="en-US"/>
           </a:p>
@@ -2844,7 +3121,7 @@
           <a:p>
             <a:fld id="{EE606AEF-1D4D-4006-A373-63B33284AF0C}" type="datetimeFigureOut">
               <a:rPr lang="en-US" smtClean="0"/>
-              <a:t>4/7/2025</a:t>
+              <a:t>4/15/2025</a:t>
             </a:fld>
             <a:endParaRPr lang="en-US"/>
           </a:p>
@@ -3132,7 +3409,7 @@
           <a:p>
             <a:fld id="{EE606AEF-1D4D-4006-A373-63B33284AF0C}" type="datetimeFigureOut">
               <a:rPr lang="en-US" smtClean="0"/>
-              <a:t>4/7/2025</a:t>
+              <a:t>4/15/2025</a:t>
             </a:fld>
             <a:endParaRPr lang="en-US"/>
           </a:p>
@@ -3373,7 +3650,7 @@
           <a:p>
             <a:fld id="{EE606AEF-1D4D-4006-A373-63B33284AF0C}" type="datetimeFigureOut">
               <a:rPr lang="en-US" smtClean="0"/>
-              <a:t>4/7/2025</a:t>
+              <a:t>4/15/2025</a:t>
             </a:fld>
             <a:endParaRPr lang="en-US"/>
           </a:p>
@@ -7641,6 +7918,2116 @@
 </p:sld>
 </file>
 
+<file path=ppt/slides/slide3.xml><?xml version="1.0" encoding="utf-8"?>
+<p:sld xmlns:a="http://schemas.openxmlformats.org/drawingml/2006/main" xmlns:r="http://schemas.openxmlformats.org/officeDocument/2006/relationships" xmlns:p="http://schemas.openxmlformats.org/presentationml/2006/main">
+  <p:cSld>
+    <p:bg>
+      <p:bgPr>
+        <a:noFill/>
+        <a:effectLst/>
+      </p:bgPr>
+    </p:bg>
+    <p:spTree>
+      <p:nvGrpSpPr>
+        <p:cNvPr id="1" name="">
+          <a:extLst>
+            <a:ext uri="{FF2B5EF4-FFF2-40B4-BE49-F238E27FC236}">
+              <a16:creationId xmlns:a16="http://schemas.microsoft.com/office/drawing/2014/main" id="{C93879BB-225D-EC08-8CC2-A08890696FD6}"/>
+            </a:ext>
+          </a:extLst>
+        </p:cNvPr>
+        <p:cNvGrpSpPr/>
+        <p:nvPr/>
+      </p:nvGrpSpPr>
+      <p:grpSpPr>
+        <a:xfrm>
+          <a:off x="0" y="0"/>
+          <a:ext cx="0" cy="0"/>
+          <a:chOff x="0" y="0"/>
+          <a:chExt cx="0" cy="0"/>
+        </a:xfrm>
+      </p:grpSpPr>
+      <p:sp>
+        <p:nvSpPr>
+          <p:cNvPr id="6" name="Oval 5">
+            <a:extLst>
+              <a:ext uri="{FF2B5EF4-FFF2-40B4-BE49-F238E27FC236}">
+                <a16:creationId xmlns:a16="http://schemas.microsoft.com/office/drawing/2014/main" id="{D82B3C97-5B54-F751-3AE0-46C4BAF1DFAE}"/>
+              </a:ext>
+            </a:extLst>
+          </p:cNvPr>
+          <p:cNvSpPr/>
+          <p:nvPr/>
+        </p:nvSpPr>
+        <p:spPr>
+          <a:xfrm>
+            <a:off x="4299447" y="2153920"/>
+            <a:ext cx="2626360" cy="2626360"/>
+          </a:xfrm>
+          <a:prstGeom prst="ellipse">
+            <a:avLst/>
+          </a:prstGeom>
+          <a:noFill/>
+          <a:ln w="38100">
+            <a:solidFill>
+              <a:schemeClr val="bg2">
+                <a:lumMod val="50000"/>
+              </a:schemeClr>
+            </a:solidFill>
+          </a:ln>
+        </p:spPr>
+        <p:style>
+          <a:lnRef idx="2">
+            <a:schemeClr val="accent1">
+              <a:shade val="15000"/>
+            </a:schemeClr>
+          </a:lnRef>
+          <a:fillRef idx="1">
+            <a:schemeClr val="accent1"/>
+          </a:fillRef>
+          <a:effectRef idx="0">
+            <a:schemeClr val="accent1"/>
+          </a:effectRef>
+          <a:fontRef idx="minor">
+            <a:schemeClr val="lt1"/>
+          </a:fontRef>
+        </p:style>
+        <p:txBody>
+          <a:bodyPr rtlCol="0" anchor="ctr"/>
+          <a:lstStyle/>
+          <a:p>
+            <a:pPr algn="ctr"/>
+            <a:endParaRPr lang="en-US"/>
+          </a:p>
+        </p:txBody>
+      </p:sp>
+      <p:sp>
+        <p:nvSpPr>
+          <p:cNvPr id="8" name="Oval 7">
+            <a:extLst>
+              <a:ext uri="{FF2B5EF4-FFF2-40B4-BE49-F238E27FC236}">
+                <a16:creationId xmlns:a16="http://schemas.microsoft.com/office/drawing/2014/main" id="{D5E2000B-386B-D856-4B92-FA1CE185D86B}"/>
+              </a:ext>
+            </a:extLst>
+          </p:cNvPr>
+          <p:cNvSpPr/>
+          <p:nvPr/>
+        </p:nvSpPr>
+        <p:spPr>
+          <a:xfrm>
+            <a:off x="4893807" y="2791461"/>
+            <a:ext cx="1405393" cy="1404620"/>
+          </a:xfrm>
+          <a:prstGeom prst="ellipse">
+            <a:avLst/>
+          </a:prstGeom>
+          <a:noFill/>
+          <a:ln w="38100">
+            <a:solidFill>
+              <a:schemeClr val="bg2">
+                <a:lumMod val="50000"/>
+              </a:schemeClr>
+            </a:solidFill>
+          </a:ln>
+        </p:spPr>
+        <p:style>
+          <a:lnRef idx="2">
+            <a:schemeClr val="accent1">
+              <a:shade val="15000"/>
+            </a:schemeClr>
+          </a:lnRef>
+          <a:fillRef idx="1">
+            <a:schemeClr val="accent1"/>
+          </a:fillRef>
+          <a:effectRef idx="0">
+            <a:schemeClr val="accent1"/>
+          </a:effectRef>
+          <a:fontRef idx="minor">
+            <a:schemeClr val="lt1"/>
+          </a:fontRef>
+        </p:style>
+        <p:txBody>
+          <a:bodyPr rtlCol="0" anchor="ctr"/>
+          <a:lstStyle/>
+          <a:p>
+            <a:pPr algn="ctr"/>
+            <a:endParaRPr lang="en-US" dirty="0"/>
+          </a:p>
+        </p:txBody>
+      </p:sp>
+      <p:cxnSp>
+        <p:nvCxnSpPr>
+          <p:cNvPr id="10" name="Straight Connector 9">
+            <a:extLst>
+              <a:ext uri="{FF2B5EF4-FFF2-40B4-BE49-F238E27FC236}">
+                <a16:creationId xmlns:a16="http://schemas.microsoft.com/office/drawing/2014/main" id="{8CB75D38-CB89-CED5-798B-3DB44439990C}"/>
+              </a:ext>
+            </a:extLst>
+          </p:cNvPr>
+          <p:cNvCxnSpPr/>
+          <p:nvPr/>
+        </p:nvCxnSpPr>
+        <p:spPr>
+          <a:xfrm flipV="1">
+            <a:off x="6502400" y="1995998"/>
+            <a:ext cx="477962" cy="477962"/>
+          </a:xfrm>
+          <a:prstGeom prst="line">
+            <a:avLst/>
+          </a:prstGeom>
+          <a:ln w="38100">
+            <a:solidFill>
+              <a:schemeClr val="bg2">
+                <a:lumMod val="50000"/>
+              </a:schemeClr>
+            </a:solidFill>
+          </a:ln>
+        </p:spPr>
+        <p:style>
+          <a:lnRef idx="2">
+            <a:schemeClr val="accent1"/>
+          </a:lnRef>
+          <a:fillRef idx="0">
+            <a:schemeClr val="accent1"/>
+          </a:fillRef>
+          <a:effectRef idx="1">
+            <a:schemeClr val="accent1"/>
+          </a:effectRef>
+          <a:fontRef idx="minor">
+            <a:schemeClr val="tx1"/>
+          </a:fontRef>
+        </p:style>
+      </p:cxnSp>
+      <p:cxnSp>
+        <p:nvCxnSpPr>
+          <p:cNvPr id="11" name="Straight Connector 10">
+            <a:extLst>
+              <a:ext uri="{FF2B5EF4-FFF2-40B4-BE49-F238E27FC236}">
+                <a16:creationId xmlns:a16="http://schemas.microsoft.com/office/drawing/2014/main" id="{4E15269C-1DFE-4A71-8727-D01C7E02B0CA}"/>
+              </a:ext>
+            </a:extLst>
+          </p:cNvPr>
+          <p:cNvCxnSpPr>
+            <a:cxnSpLocks/>
+          </p:cNvCxnSpPr>
+          <p:nvPr/>
+        </p:nvCxnSpPr>
+        <p:spPr>
+          <a:xfrm>
+            <a:off x="6720840" y="4135120"/>
+            <a:ext cx="723237" cy="396240"/>
+          </a:xfrm>
+          <a:prstGeom prst="line">
+            <a:avLst/>
+          </a:prstGeom>
+          <a:ln w="38100">
+            <a:solidFill>
+              <a:schemeClr val="bg2">
+                <a:lumMod val="50000"/>
+              </a:schemeClr>
+            </a:solidFill>
+          </a:ln>
+        </p:spPr>
+        <p:style>
+          <a:lnRef idx="2">
+            <a:schemeClr val="accent1"/>
+          </a:lnRef>
+          <a:fillRef idx="0">
+            <a:schemeClr val="accent1"/>
+          </a:fillRef>
+          <a:effectRef idx="1">
+            <a:schemeClr val="accent1"/>
+          </a:effectRef>
+          <a:fontRef idx="minor">
+            <a:schemeClr val="tx1"/>
+          </a:fontRef>
+        </p:style>
+      </p:cxnSp>
+      <p:cxnSp>
+        <p:nvCxnSpPr>
+          <p:cNvPr id="13" name="Straight Connector 12">
+            <a:extLst>
+              <a:ext uri="{FF2B5EF4-FFF2-40B4-BE49-F238E27FC236}">
+                <a16:creationId xmlns:a16="http://schemas.microsoft.com/office/drawing/2014/main" id="{4F0128D6-9044-A644-7826-1B7FCC57711B}"/>
+              </a:ext>
+            </a:extLst>
+          </p:cNvPr>
+          <p:cNvCxnSpPr>
+            <a:cxnSpLocks/>
+          </p:cNvCxnSpPr>
+          <p:nvPr/>
+        </p:nvCxnSpPr>
+        <p:spPr>
+          <a:xfrm flipH="1">
+            <a:off x="4648200" y="4562282"/>
+            <a:ext cx="257590" cy="375920"/>
+          </a:xfrm>
+          <a:prstGeom prst="line">
+            <a:avLst/>
+          </a:prstGeom>
+          <a:ln w="38100">
+            <a:solidFill>
+              <a:schemeClr val="bg2">
+                <a:lumMod val="50000"/>
+              </a:schemeClr>
+            </a:solidFill>
+          </a:ln>
+        </p:spPr>
+        <p:style>
+          <a:lnRef idx="2">
+            <a:schemeClr val="accent1"/>
+          </a:lnRef>
+          <a:fillRef idx="0">
+            <a:schemeClr val="accent1"/>
+          </a:fillRef>
+          <a:effectRef idx="1">
+            <a:schemeClr val="accent1"/>
+          </a:effectRef>
+          <a:fontRef idx="minor">
+            <a:schemeClr val="tx1"/>
+          </a:fontRef>
+        </p:style>
+      </p:cxnSp>
+      <p:cxnSp>
+        <p:nvCxnSpPr>
+          <p:cNvPr id="15" name="Straight Connector 14">
+            <a:extLst>
+              <a:ext uri="{FF2B5EF4-FFF2-40B4-BE49-F238E27FC236}">
+                <a16:creationId xmlns:a16="http://schemas.microsoft.com/office/drawing/2014/main" id="{EC1C5831-4C1B-5B58-22E2-F66E5F6498FD}"/>
+              </a:ext>
+            </a:extLst>
+          </p:cNvPr>
+          <p:cNvCxnSpPr>
+            <a:cxnSpLocks/>
+          </p:cNvCxnSpPr>
+          <p:nvPr/>
+        </p:nvCxnSpPr>
+        <p:spPr>
+          <a:xfrm flipH="1" flipV="1">
+            <a:off x="3745617" y="3159760"/>
+            <a:ext cx="577630" cy="81280"/>
+          </a:xfrm>
+          <a:prstGeom prst="line">
+            <a:avLst/>
+          </a:prstGeom>
+          <a:ln w="38100">
+            <a:solidFill>
+              <a:schemeClr val="bg2">
+                <a:lumMod val="50000"/>
+              </a:schemeClr>
+            </a:solidFill>
+          </a:ln>
+        </p:spPr>
+        <p:style>
+          <a:lnRef idx="2">
+            <a:schemeClr val="accent1"/>
+          </a:lnRef>
+          <a:fillRef idx="0">
+            <a:schemeClr val="accent1"/>
+          </a:fillRef>
+          <a:effectRef idx="1">
+            <a:schemeClr val="accent1"/>
+          </a:effectRef>
+          <a:fontRef idx="minor">
+            <a:schemeClr val="tx1"/>
+          </a:fontRef>
+        </p:style>
+      </p:cxnSp>
+      <p:cxnSp>
+        <p:nvCxnSpPr>
+          <p:cNvPr id="17" name="Straight Connector 16">
+            <a:extLst>
+              <a:ext uri="{FF2B5EF4-FFF2-40B4-BE49-F238E27FC236}">
+                <a16:creationId xmlns:a16="http://schemas.microsoft.com/office/drawing/2014/main" id="{0DEF5236-0F1E-BAA8-0794-9F5403517EF3}"/>
+              </a:ext>
+            </a:extLst>
+          </p:cNvPr>
+          <p:cNvCxnSpPr>
+            <a:cxnSpLocks/>
+          </p:cNvCxnSpPr>
+          <p:nvPr/>
+        </p:nvCxnSpPr>
+        <p:spPr>
+          <a:xfrm flipV="1">
+            <a:off x="6360160" y="2275422"/>
+            <a:ext cx="55880" cy="91858"/>
+          </a:xfrm>
+          <a:prstGeom prst="line">
+            <a:avLst/>
+          </a:prstGeom>
+          <a:ln w="38100">
+            <a:solidFill>
+              <a:schemeClr val="bg2">
+                <a:lumMod val="50000"/>
+              </a:schemeClr>
+            </a:solidFill>
+          </a:ln>
+        </p:spPr>
+        <p:style>
+          <a:lnRef idx="2">
+            <a:schemeClr val="accent1"/>
+          </a:lnRef>
+          <a:fillRef idx="0">
+            <a:schemeClr val="accent1"/>
+          </a:fillRef>
+          <a:effectRef idx="1">
+            <a:schemeClr val="accent1"/>
+          </a:effectRef>
+          <a:fontRef idx="minor">
+            <a:schemeClr val="tx1"/>
+          </a:fontRef>
+        </p:style>
+      </p:cxnSp>
+      <p:cxnSp>
+        <p:nvCxnSpPr>
+          <p:cNvPr id="19" name="Straight Connector 18">
+            <a:extLst>
+              <a:ext uri="{FF2B5EF4-FFF2-40B4-BE49-F238E27FC236}">
+                <a16:creationId xmlns:a16="http://schemas.microsoft.com/office/drawing/2014/main" id="{35E59396-DAEE-0ECC-22AA-01428FCEFED6}"/>
+              </a:ext>
+            </a:extLst>
+          </p:cNvPr>
+          <p:cNvCxnSpPr>
+            <a:cxnSpLocks/>
+          </p:cNvCxnSpPr>
+          <p:nvPr/>
+        </p:nvCxnSpPr>
+        <p:spPr>
+          <a:xfrm flipH="1">
+            <a:off x="5490074" y="4775421"/>
+            <a:ext cx="15240" cy="162781"/>
+          </a:xfrm>
+          <a:prstGeom prst="line">
+            <a:avLst/>
+          </a:prstGeom>
+          <a:ln w="38100">
+            <a:solidFill>
+              <a:schemeClr val="bg2">
+                <a:lumMod val="50000"/>
+              </a:schemeClr>
+            </a:solidFill>
+          </a:ln>
+        </p:spPr>
+        <p:style>
+          <a:lnRef idx="2">
+            <a:schemeClr val="accent1"/>
+          </a:lnRef>
+          <a:fillRef idx="0">
+            <a:schemeClr val="accent1"/>
+          </a:fillRef>
+          <a:effectRef idx="1">
+            <a:schemeClr val="accent1"/>
+          </a:effectRef>
+          <a:fontRef idx="minor">
+            <a:schemeClr val="tx1"/>
+          </a:fontRef>
+        </p:style>
+      </p:cxnSp>
+      <p:cxnSp>
+        <p:nvCxnSpPr>
+          <p:cNvPr id="20" name="Straight Connector 19">
+            <a:extLst>
+              <a:ext uri="{FF2B5EF4-FFF2-40B4-BE49-F238E27FC236}">
+                <a16:creationId xmlns:a16="http://schemas.microsoft.com/office/drawing/2014/main" id="{D890FD44-1994-CE03-F482-EE7E1FF1F059}"/>
+              </a:ext>
+            </a:extLst>
+          </p:cNvPr>
+          <p:cNvCxnSpPr>
+            <a:cxnSpLocks/>
+          </p:cNvCxnSpPr>
+          <p:nvPr/>
+        </p:nvCxnSpPr>
+        <p:spPr>
+          <a:xfrm>
+            <a:off x="5591590" y="4775642"/>
+            <a:ext cx="0" cy="309438"/>
+          </a:xfrm>
+          <a:prstGeom prst="line">
+            <a:avLst/>
+          </a:prstGeom>
+          <a:ln w="38100">
+            <a:solidFill>
+              <a:schemeClr val="bg2">
+                <a:lumMod val="50000"/>
+              </a:schemeClr>
+            </a:solidFill>
+          </a:ln>
+        </p:spPr>
+        <p:style>
+          <a:lnRef idx="2">
+            <a:schemeClr val="accent1"/>
+          </a:lnRef>
+          <a:fillRef idx="0">
+            <a:schemeClr val="accent1"/>
+          </a:fillRef>
+          <a:effectRef idx="1">
+            <a:schemeClr val="accent1"/>
+          </a:effectRef>
+          <a:fontRef idx="minor">
+            <a:schemeClr val="tx1"/>
+          </a:fontRef>
+        </p:style>
+      </p:cxnSp>
+      <p:sp>
+        <p:nvSpPr>
+          <p:cNvPr id="23" name="Oval 22">
+            <a:extLst>
+              <a:ext uri="{FF2B5EF4-FFF2-40B4-BE49-F238E27FC236}">
+                <a16:creationId xmlns:a16="http://schemas.microsoft.com/office/drawing/2014/main" id="{136D557B-E5BB-923F-797B-7E5920F03519}"/>
+              </a:ext>
+            </a:extLst>
+          </p:cNvPr>
+          <p:cNvSpPr/>
+          <p:nvPr/>
+        </p:nvSpPr>
+        <p:spPr>
+          <a:xfrm>
+            <a:off x="6299200" y="1823720"/>
+            <a:ext cx="477962" cy="477962"/>
+          </a:xfrm>
+          <a:prstGeom prst="ellipse">
+            <a:avLst/>
+          </a:prstGeom>
+          <a:ln w="38100">
+            <a:solidFill>
+              <a:schemeClr val="bg2">
+                <a:lumMod val="50000"/>
+              </a:schemeClr>
+            </a:solidFill>
+          </a:ln>
+        </p:spPr>
+        <p:style>
+          <a:lnRef idx="2">
+            <a:schemeClr val="accent1">
+              <a:shade val="15000"/>
+            </a:schemeClr>
+          </a:lnRef>
+          <a:fillRef idx="1">
+            <a:schemeClr val="accent1"/>
+          </a:fillRef>
+          <a:effectRef idx="0">
+            <a:schemeClr val="accent1"/>
+          </a:effectRef>
+          <a:fontRef idx="minor">
+            <a:schemeClr val="lt1"/>
+          </a:fontRef>
+        </p:style>
+        <p:txBody>
+          <a:bodyPr rtlCol="0" anchor="ctr"/>
+          <a:lstStyle/>
+          <a:p>
+            <a:pPr algn="ctr"/>
+            <a:r>
+              <a:rPr lang="en-US" b="0" i="0" dirty="0">
+                <a:solidFill>
+                  <a:schemeClr val="bg1"/>
+                </a:solidFill>
+                <a:effectLst/>
+                <a:latin typeface="Arial" panose="020B0604020202020204" pitchFamily="34" charset="0"/>
+              </a:rPr>
+              <a:t>☽︎</a:t>
+            </a:r>
+            <a:endParaRPr lang="en-US" dirty="0">
+              <a:solidFill>
+                <a:schemeClr val="bg1"/>
+              </a:solidFill>
+            </a:endParaRPr>
+          </a:p>
+        </p:txBody>
+      </p:sp>
+      <p:sp>
+        <p:nvSpPr>
+          <p:cNvPr id="24" name="Oval 23">
+            <a:extLst>
+              <a:ext uri="{FF2B5EF4-FFF2-40B4-BE49-F238E27FC236}">
+                <a16:creationId xmlns:a16="http://schemas.microsoft.com/office/drawing/2014/main" id="{D9695525-FAEF-FE43-4E49-F85AD0F2CFE9}"/>
+              </a:ext>
+            </a:extLst>
+          </p:cNvPr>
+          <p:cNvSpPr/>
+          <p:nvPr/>
+        </p:nvSpPr>
+        <p:spPr>
+          <a:xfrm>
+            <a:off x="6898640" y="1595120"/>
+            <a:ext cx="477962" cy="477962"/>
+          </a:xfrm>
+          <a:prstGeom prst="ellipse">
+            <a:avLst/>
+          </a:prstGeom>
+          <a:ln w="38100">
+            <a:solidFill>
+              <a:schemeClr val="bg2">
+                <a:lumMod val="50000"/>
+              </a:schemeClr>
+            </a:solidFill>
+          </a:ln>
+        </p:spPr>
+        <p:style>
+          <a:lnRef idx="2">
+            <a:schemeClr val="accent1">
+              <a:shade val="15000"/>
+            </a:schemeClr>
+          </a:lnRef>
+          <a:fillRef idx="1">
+            <a:schemeClr val="accent1"/>
+          </a:fillRef>
+          <a:effectRef idx="0">
+            <a:schemeClr val="accent1"/>
+          </a:effectRef>
+          <a:fontRef idx="minor">
+            <a:schemeClr val="lt1"/>
+          </a:fontRef>
+        </p:style>
+        <p:txBody>
+          <a:bodyPr rtlCol="0" anchor="ctr"/>
+          <a:lstStyle/>
+          <a:p>
+            <a:pPr algn="ctr"/>
+            <a:r>
+              <a:rPr lang="en-US" dirty="0"/>
+              <a:t>♃</a:t>
+            </a:r>
+          </a:p>
+        </p:txBody>
+      </p:sp>
+      <p:sp>
+        <p:nvSpPr>
+          <p:cNvPr id="25" name="Oval 24">
+            <a:extLst>
+              <a:ext uri="{FF2B5EF4-FFF2-40B4-BE49-F238E27FC236}">
+                <a16:creationId xmlns:a16="http://schemas.microsoft.com/office/drawing/2014/main" id="{8F0EA0EB-C467-E238-E71B-5591281DDA6F}"/>
+              </a:ext>
+            </a:extLst>
+          </p:cNvPr>
+          <p:cNvSpPr/>
+          <p:nvPr/>
+        </p:nvSpPr>
+        <p:spPr>
+          <a:xfrm>
+            <a:off x="7411720" y="4409440"/>
+            <a:ext cx="477962" cy="477962"/>
+          </a:xfrm>
+          <a:prstGeom prst="ellipse">
+            <a:avLst/>
+          </a:prstGeom>
+          <a:ln w="38100">
+            <a:solidFill>
+              <a:schemeClr val="bg2">
+                <a:lumMod val="50000"/>
+              </a:schemeClr>
+            </a:solidFill>
+          </a:ln>
+        </p:spPr>
+        <p:style>
+          <a:lnRef idx="2">
+            <a:schemeClr val="accent1">
+              <a:shade val="15000"/>
+            </a:schemeClr>
+          </a:lnRef>
+          <a:fillRef idx="1">
+            <a:schemeClr val="accent1"/>
+          </a:fillRef>
+          <a:effectRef idx="0">
+            <a:schemeClr val="accent1"/>
+          </a:effectRef>
+          <a:fontRef idx="minor">
+            <a:schemeClr val="lt1"/>
+          </a:fontRef>
+        </p:style>
+        <p:txBody>
+          <a:bodyPr rtlCol="0" anchor="ctr"/>
+          <a:lstStyle/>
+          <a:p>
+            <a:pPr algn="ctr"/>
+            <a:r>
+              <a:rPr lang="en-US" dirty="0"/>
+              <a:t>♄</a:t>
+            </a:r>
+          </a:p>
+        </p:txBody>
+      </p:sp>
+      <p:sp>
+        <p:nvSpPr>
+          <p:cNvPr id="26" name="Oval 25">
+            <a:extLst>
+              <a:ext uri="{FF2B5EF4-FFF2-40B4-BE49-F238E27FC236}">
+                <a16:creationId xmlns:a16="http://schemas.microsoft.com/office/drawing/2014/main" id="{975D6A9F-C89D-673A-8C1A-B4D1A0B8AAA1}"/>
+              </a:ext>
+            </a:extLst>
+          </p:cNvPr>
+          <p:cNvSpPr/>
+          <p:nvPr/>
+        </p:nvSpPr>
+        <p:spPr>
+          <a:xfrm>
+            <a:off x="4239966" y="4880002"/>
+            <a:ext cx="477962" cy="477962"/>
+          </a:xfrm>
+          <a:prstGeom prst="ellipse">
+            <a:avLst/>
+          </a:prstGeom>
+          <a:ln w="38100">
+            <a:solidFill>
+              <a:schemeClr val="bg2">
+                <a:lumMod val="50000"/>
+              </a:schemeClr>
+            </a:solidFill>
+          </a:ln>
+        </p:spPr>
+        <p:style>
+          <a:lnRef idx="2">
+            <a:schemeClr val="accent1">
+              <a:shade val="15000"/>
+            </a:schemeClr>
+          </a:lnRef>
+          <a:fillRef idx="1">
+            <a:schemeClr val="accent1"/>
+          </a:fillRef>
+          <a:effectRef idx="0">
+            <a:schemeClr val="accent1"/>
+          </a:effectRef>
+          <a:fontRef idx="minor">
+            <a:schemeClr val="lt1"/>
+          </a:fontRef>
+        </p:style>
+        <p:txBody>
+          <a:bodyPr rtlCol="0" anchor="ctr"/>
+          <a:lstStyle/>
+          <a:p>
+            <a:pPr algn="ctr"/>
+            <a:r>
+              <a:rPr lang="en-US"/>
+              <a:t>♀</a:t>
+            </a:r>
+          </a:p>
+        </p:txBody>
+      </p:sp>
+      <p:sp>
+        <p:nvSpPr>
+          <p:cNvPr id="27" name="Oval 26">
+            <a:extLst>
+              <a:ext uri="{FF2B5EF4-FFF2-40B4-BE49-F238E27FC236}">
+                <a16:creationId xmlns:a16="http://schemas.microsoft.com/office/drawing/2014/main" id="{25B634A5-4AE8-99F5-E72F-6F9C2482856F}"/>
+              </a:ext>
+            </a:extLst>
+          </p:cNvPr>
+          <p:cNvSpPr/>
+          <p:nvPr/>
+        </p:nvSpPr>
+        <p:spPr>
+          <a:xfrm>
+            <a:off x="5385849" y="5098014"/>
+            <a:ext cx="477962" cy="477962"/>
+          </a:xfrm>
+          <a:prstGeom prst="ellipse">
+            <a:avLst/>
+          </a:prstGeom>
+          <a:ln w="38100">
+            <a:solidFill>
+              <a:schemeClr val="bg2">
+                <a:lumMod val="50000"/>
+              </a:schemeClr>
+            </a:solidFill>
+          </a:ln>
+        </p:spPr>
+        <p:style>
+          <a:lnRef idx="2">
+            <a:schemeClr val="accent1">
+              <a:shade val="15000"/>
+            </a:schemeClr>
+          </a:lnRef>
+          <a:fillRef idx="1">
+            <a:schemeClr val="accent1"/>
+          </a:fillRef>
+          <a:effectRef idx="0">
+            <a:schemeClr val="accent1"/>
+          </a:effectRef>
+          <a:fontRef idx="minor">
+            <a:schemeClr val="lt1"/>
+          </a:fontRef>
+        </p:style>
+        <p:txBody>
+          <a:bodyPr rtlCol="0" anchor="ctr"/>
+          <a:lstStyle/>
+          <a:p>
+            <a:pPr algn="ctr"/>
+            <a:r>
+              <a:rPr lang="en-US" dirty="0"/>
+              <a:t>☿</a:t>
+            </a:r>
+          </a:p>
+        </p:txBody>
+      </p:sp>
+      <p:sp>
+        <p:nvSpPr>
+          <p:cNvPr id="28" name="Oval 27">
+            <a:extLst>
+              <a:ext uri="{FF2B5EF4-FFF2-40B4-BE49-F238E27FC236}">
+                <a16:creationId xmlns:a16="http://schemas.microsoft.com/office/drawing/2014/main" id="{F4F497BD-B98E-8EAB-9B77-226026AB52A3}"/>
+              </a:ext>
+            </a:extLst>
+          </p:cNvPr>
+          <p:cNvSpPr/>
+          <p:nvPr/>
+        </p:nvSpPr>
+        <p:spPr>
+          <a:xfrm>
+            <a:off x="5205515" y="4952321"/>
+            <a:ext cx="477962" cy="477962"/>
+          </a:xfrm>
+          <a:prstGeom prst="ellipse">
+            <a:avLst/>
+          </a:prstGeom>
+          <a:ln w="38100">
+            <a:solidFill>
+              <a:schemeClr val="bg2">
+                <a:lumMod val="50000"/>
+              </a:schemeClr>
+            </a:solidFill>
+          </a:ln>
+        </p:spPr>
+        <p:style>
+          <a:lnRef idx="2">
+            <a:schemeClr val="accent1">
+              <a:shade val="15000"/>
+            </a:schemeClr>
+          </a:lnRef>
+          <a:fillRef idx="1">
+            <a:schemeClr val="accent1"/>
+          </a:fillRef>
+          <a:effectRef idx="0">
+            <a:schemeClr val="accent1"/>
+          </a:effectRef>
+          <a:fontRef idx="minor">
+            <a:schemeClr val="lt1"/>
+          </a:fontRef>
+        </p:style>
+        <p:txBody>
+          <a:bodyPr rtlCol="0" anchor="ctr"/>
+          <a:lstStyle/>
+          <a:p>
+            <a:pPr algn="ctr"/>
+            <a:r>
+              <a:rPr lang="en-US" b="0" i="0" dirty="0">
+                <a:solidFill>
+                  <a:schemeClr val="bg1"/>
+                </a:solidFill>
+                <a:effectLst/>
+                <a:latin typeface="Arial" panose="020B0604020202020204" pitchFamily="34" charset="0"/>
+              </a:rPr>
+              <a:t>☉︎</a:t>
+            </a:r>
+            <a:endParaRPr lang="en-US" dirty="0">
+              <a:solidFill>
+                <a:schemeClr val="bg1"/>
+              </a:solidFill>
+            </a:endParaRPr>
+          </a:p>
+        </p:txBody>
+      </p:sp>
+      <p:sp>
+        <p:nvSpPr>
+          <p:cNvPr id="29" name="Oval 28">
+            <a:extLst>
+              <a:ext uri="{FF2B5EF4-FFF2-40B4-BE49-F238E27FC236}">
+                <a16:creationId xmlns:a16="http://schemas.microsoft.com/office/drawing/2014/main" id="{8D5D513E-E9C8-9C59-E63E-19D26F80A6F2}"/>
+              </a:ext>
+            </a:extLst>
+          </p:cNvPr>
+          <p:cNvSpPr/>
+          <p:nvPr/>
+        </p:nvSpPr>
+        <p:spPr>
+          <a:xfrm>
+            <a:off x="3303215" y="2875280"/>
+            <a:ext cx="477962" cy="477962"/>
+          </a:xfrm>
+          <a:prstGeom prst="ellipse">
+            <a:avLst/>
+          </a:prstGeom>
+          <a:ln w="38100">
+            <a:solidFill>
+              <a:schemeClr val="bg2">
+                <a:lumMod val="50000"/>
+              </a:schemeClr>
+            </a:solidFill>
+          </a:ln>
+        </p:spPr>
+        <p:style>
+          <a:lnRef idx="2">
+            <a:schemeClr val="accent1">
+              <a:shade val="15000"/>
+            </a:schemeClr>
+          </a:lnRef>
+          <a:fillRef idx="1">
+            <a:schemeClr val="accent1"/>
+          </a:fillRef>
+          <a:effectRef idx="0">
+            <a:schemeClr val="accent1"/>
+          </a:effectRef>
+          <a:fontRef idx="minor">
+            <a:schemeClr val="lt1"/>
+          </a:fontRef>
+        </p:style>
+        <p:txBody>
+          <a:bodyPr rtlCol="0" anchor="ctr"/>
+          <a:lstStyle/>
+          <a:p>
+            <a:pPr algn="ctr"/>
+            <a:r>
+              <a:rPr lang="en-US" dirty="0"/>
+              <a:t>♂</a:t>
+            </a:r>
+          </a:p>
+        </p:txBody>
+      </p:sp>
+      <p:sp>
+        <p:nvSpPr>
+          <p:cNvPr id="30" name="Oval 29">
+            <a:extLst>
+              <a:ext uri="{FF2B5EF4-FFF2-40B4-BE49-F238E27FC236}">
+                <a16:creationId xmlns:a16="http://schemas.microsoft.com/office/drawing/2014/main" id="{34F78AF4-C9D8-D4A3-9291-3CE35D97BF62}"/>
+              </a:ext>
+            </a:extLst>
+          </p:cNvPr>
+          <p:cNvSpPr/>
+          <p:nvPr/>
+        </p:nvSpPr>
+        <p:spPr>
+          <a:xfrm>
+            <a:off x="5356446" y="3236402"/>
+            <a:ext cx="477962" cy="477962"/>
+          </a:xfrm>
+          <a:prstGeom prst="ellipse">
+            <a:avLst/>
+          </a:prstGeom>
+          <a:ln w="38100">
+            <a:solidFill>
+              <a:schemeClr val="bg2">
+                <a:lumMod val="50000"/>
+              </a:schemeClr>
+            </a:solidFill>
+          </a:ln>
+        </p:spPr>
+        <p:style>
+          <a:lnRef idx="2">
+            <a:schemeClr val="accent1">
+              <a:shade val="15000"/>
+            </a:schemeClr>
+          </a:lnRef>
+          <a:fillRef idx="1">
+            <a:schemeClr val="accent1"/>
+          </a:fillRef>
+          <a:effectRef idx="0">
+            <a:schemeClr val="accent1"/>
+          </a:effectRef>
+          <a:fontRef idx="minor">
+            <a:schemeClr val="lt1"/>
+          </a:fontRef>
+        </p:style>
+        <p:txBody>
+          <a:bodyPr rtlCol="0" anchor="ctr"/>
+          <a:lstStyle/>
+          <a:p>
+            <a:pPr algn="ctr"/>
+            <a:endParaRPr lang="en-US" dirty="0">
+              <a:solidFill>
+                <a:schemeClr val="bg1"/>
+              </a:solidFill>
+            </a:endParaRPr>
+          </a:p>
+        </p:txBody>
+      </p:sp>
+      <p:cxnSp>
+        <p:nvCxnSpPr>
+          <p:cNvPr id="31" name="Straight Connector 30">
+            <a:extLst>
+              <a:ext uri="{FF2B5EF4-FFF2-40B4-BE49-F238E27FC236}">
+                <a16:creationId xmlns:a16="http://schemas.microsoft.com/office/drawing/2014/main" id="{AB898D4A-44BD-E857-913A-04D815E2EB31}"/>
+              </a:ext>
+            </a:extLst>
+          </p:cNvPr>
+          <p:cNvCxnSpPr>
+            <a:cxnSpLocks/>
+          </p:cNvCxnSpPr>
+          <p:nvPr/>
+        </p:nvCxnSpPr>
+        <p:spPr>
+          <a:xfrm flipV="1">
+            <a:off x="6236142" y="2857059"/>
+            <a:ext cx="477962" cy="275203"/>
+          </a:xfrm>
+          <a:prstGeom prst="line">
+            <a:avLst/>
+          </a:prstGeom>
+          <a:ln w="38100">
+            <a:solidFill>
+              <a:schemeClr val="bg2">
+                <a:lumMod val="50000"/>
+              </a:schemeClr>
+            </a:solidFill>
+          </a:ln>
+        </p:spPr>
+        <p:style>
+          <a:lnRef idx="2">
+            <a:schemeClr val="accent1"/>
+          </a:lnRef>
+          <a:fillRef idx="0">
+            <a:schemeClr val="accent1"/>
+          </a:fillRef>
+          <a:effectRef idx="1">
+            <a:schemeClr val="accent1"/>
+          </a:effectRef>
+          <a:fontRef idx="minor">
+            <a:schemeClr val="tx1"/>
+          </a:fontRef>
+        </p:style>
+      </p:cxnSp>
+      <p:cxnSp>
+        <p:nvCxnSpPr>
+          <p:cNvPr id="33" name="Straight Connector 32">
+            <a:extLst>
+              <a:ext uri="{FF2B5EF4-FFF2-40B4-BE49-F238E27FC236}">
+                <a16:creationId xmlns:a16="http://schemas.microsoft.com/office/drawing/2014/main" id="{0FE75F2A-76AF-8B24-2848-3683DB1EC8DE}"/>
+              </a:ext>
+            </a:extLst>
+          </p:cNvPr>
+          <p:cNvCxnSpPr>
+            <a:cxnSpLocks/>
+          </p:cNvCxnSpPr>
+          <p:nvPr/>
+        </p:nvCxnSpPr>
+        <p:spPr>
+          <a:xfrm>
+            <a:off x="6307262" y="3538662"/>
+            <a:ext cx="563714" cy="71120"/>
+          </a:xfrm>
+          <a:prstGeom prst="line">
+            <a:avLst/>
+          </a:prstGeom>
+          <a:ln w="38100">
+            <a:solidFill>
+              <a:schemeClr val="bg2">
+                <a:lumMod val="50000"/>
+              </a:schemeClr>
+            </a:solidFill>
+          </a:ln>
+        </p:spPr>
+        <p:style>
+          <a:lnRef idx="2">
+            <a:schemeClr val="accent1"/>
+          </a:lnRef>
+          <a:fillRef idx="0">
+            <a:schemeClr val="accent1"/>
+          </a:fillRef>
+          <a:effectRef idx="1">
+            <a:schemeClr val="accent1"/>
+          </a:effectRef>
+          <a:fontRef idx="minor">
+            <a:schemeClr val="tx1"/>
+          </a:fontRef>
+        </p:style>
+      </p:cxnSp>
+      <p:cxnSp>
+        <p:nvCxnSpPr>
+          <p:cNvPr id="34" name="Straight Connector 33">
+            <a:extLst>
+              <a:ext uri="{FF2B5EF4-FFF2-40B4-BE49-F238E27FC236}">
+                <a16:creationId xmlns:a16="http://schemas.microsoft.com/office/drawing/2014/main" id="{52CF4136-B483-0AA0-4D0C-3A1689146CBE}"/>
+              </a:ext>
+            </a:extLst>
+          </p:cNvPr>
+          <p:cNvCxnSpPr>
+            <a:cxnSpLocks/>
+          </p:cNvCxnSpPr>
+          <p:nvPr/>
+        </p:nvCxnSpPr>
+        <p:spPr>
+          <a:xfrm>
+            <a:off x="6205662" y="3843462"/>
+            <a:ext cx="495231" cy="286138"/>
+          </a:xfrm>
+          <a:prstGeom prst="line">
+            <a:avLst/>
+          </a:prstGeom>
+          <a:ln w="38100">
+            <a:solidFill>
+              <a:schemeClr val="bg2">
+                <a:lumMod val="50000"/>
+              </a:schemeClr>
+            </a:solidFill>
+          </a:ln>
+        </p:spPr>
+        <p:style>
+          <a:lnRef idx="2">
+            <a:schemeClr val="accent1"/>
+          </a:lnRef>
+          <a:fillRef idx="0">
+            <a:schemeClr val="accent1"/>
+          </a:fillRef>
+          <a:effectRef idx="1">
+            <a:schemeClr val="accent1"/>
+          </a:effectRef>
+          <a:fontRef idx="minor">
+            <a:schemeClr val="tx1"/>
+          </a:fontRef>
+        </p:style>
+      </p:cxnSp>
+      <p:cxnSp>
+        <p:nvCxnSpPr>
+          <p:cNvPr id="35" name="Straight Connector 34">
+            <a:extLst>
+              <a:ext uri="{FF2B5EF4-FFF2-40B4-BE49-F238E27FC236}">
+                <a16:creationId xmlns:a16="http://schemas.microsoft.com/office/drawing/2014/main" id="{22190D73-BFD6-D0D9-AAD4-F549AEE003A7}"/>
+              </a:ext>
+            </a:extLst>
+          </p:cNvPr>
+          <p:cNvCxnSpPr>
+            <a:cxnSpLocks/>
+          </p:cNvCxnSpPr>
+          <p:nvPr/>
+        </p:nvCxnSpPr>
+        <p:spPr>
+          <a:xfrm>
+            <a:off x="5942330" y="4118665"/>
+            <a:ext cx="277909" cy="434783"/>
+          </a:xfrm>
+          <a:prstGeom prst="line">
+            <a:avLst/>
+          </a:prstGeom>
+          <a:ln w="38100">
+            <a:solidFill>
+              <a:schemeClr val="bg2">
+                <a:lumMod val="50000"/>
+              </a:schemeClr>
+            </a:solidFill>
+          </a:ln>
+        </p:spPr>
+        <p:style>
+          <a:lnRef idx="2">
+            <a:schemeClr val="accent1"/>
+          </a:lnRef>
+          <a:fillRef idx="0">
+            <a:schemeClr val="accent1"/>
+          </a:fillRef>
+          <a:effectRef idx="1">
+            <a:schemeClr val="accent1"/>
+          </a:effectRef>
+          <a:fontRef idx="minor">
+            <a:schemeClr val="tx1"/>
+          </a:fontRef>
+        </p:style>
+      </p:cxnSp>
+      <p:cxnSp>
+        <p:nvCxnSpPr>
+          <p:cNvPr id="36" name="Straight Connector 35">
+            <a:extLst>
+              <a:ext uri="{FF2B5EF4-FFF2-40B4-BE49-F238E27FC236}">
+                <a16:creationId xmlns:a16="http://schemas.microsoft.com/office/drawing/2014/main" id="{679136F7-677A-20A7-3507-079427D3193C}"/>
+              </a:ext>
+            </a:extLst>
+          </p:cNvPr>
+          <p:cNvCxnSpPr>
+            <a:cxnSpLocks/>
+          </p:cNvCxnSpPr>
+          <p:nvPr/>
+        </p:nvCxnSpPr>
+        <p:spPr>
+          <a:xfrm flipH="1">
+            <a:off x="5504512" y="4194865"/>
+            <a:ext cx="41578" cy="509215"/>
+          </a:xfrm>
+          <a:prstGeom prst="line">
+            <a:avLst/>
+          </a:prstGeom>
+          <a:ln w="38100">
+            <a:solidFill>
+              <a:schemeClr val="bg2">
+                <a:lumMod val="50000"/>
+              </a:schemeClr>
+            </a:solidFill>
+          </a:ln>
+        </p:spPr>
+        <p:style>
+          <a:lnRef idx="2">
+            <a:schemeClr val="accent1"/>
+          </a:lnRef>
+          <a:fillRef idx="0">
+            <a:schemeClr val="accent1"/>
+          </a:fillRef>
+          <a:effectRef idx="1">
+            <a:schemeClr val="accent1"/>
+          </a:effectRef>
+          <a:fontRef idx="minor">
+            <a:schemeClr val="tx1"/>
+          </a:fontRef>
+        </p:style>
+      </p:cxnSp>
+      <p:cxnSp>
+        <p:nvCxnSpPr>
+          <p:cNvPr id="37" name="Straight Connector 36">
+            <a:extLst>
+              <a:ext uri="{FF2B5EF4-FFF2-40B4-BE49-F238E27FC236}">
+                <a16:creationId xmlns:a16="http://schemas.microsoft.com/office/drawing/2014/main" id="{EBFDB554-4FA8-1190-F62A-C2F1ADC8FECA}"/>
+              </a:ext>
+            </a:extLst>
+          </p:cNvPr>
+          <p:cNvCxnSpPr>
+            <a:cxnSpLocks/>
+          </p:cNvCxnSpPr>
+          <p:nvPr/>
+        </p:nvCxnSpPr>
+        <p:spPr>
+          <a:xfrm flipH="1">
+            <a:off x="4968295" y="4108505"/>
+            <a:ext cx="257755" cy="443176"/>
+          </a:xfrm>
+          <a:prstGeom prst="line">
+            <a:avLst/>
+          </a:prstGeom>
+          <a:ln w="38100">
+            <a:solidFill>
+              <a:schemeClr val="bg2">
+                <a:lumMod val="50000"/>
+              </a:schemeClr>
+            </a:solidFill>
+          </a:ln>
+        </p:spPr>
+        <p:style>
+          <a:lnRef idx="2">
+            <a:schemeClr val="accent1"/>
+          </a:lnRef>
+          <a:fillRef idx="0">
+            <a:schemeClr val="accent1"/>
+          </a:fillRef>
+          <a:effectRef idx="1">
+            <a:schemeClr val="accent1"/>
+          </a:effectRef>
+          <a:fontRef idx="minor">
+            <a:schemeClr val="tx1"/>
+          </a:fontRef>
+        </p:style>
+      </p:cxnSp>
+      <p:cxnSp>
+        <p:nvCxnSpPr>
+          <p:cNvPr id="38" name="Straight Connector 37">
+            <a:extLst>
+              <a:ext uri="{FF2B5EF4-FFF2-40B4-BE49-F238E27FC236}">
+                <a16:creationId xmlns:a16="http://schemas.microsoft.com/office/drawing/2014/main" id="{ACB872E2-FD6C-A805-4387-EA032F8FB3A7}"/>
+              </a:ext>
+            </a:extLst>
+          </p:cNvPr>
+          <p:cNvCxnSpPr>
+            <a:cxnSpLocks/>
+          </p:cNvCxnSpPr>
+          <p:nvPr/>
+        </p:nvCxnSpPr>
+        <p:spPr>
+          <a:xfrm flipH="1">
+            <a:off x="4587240" y="3884985"/>
+            <a:ext cx="435610" cy="338594"/>
+          </a:xfrm>
+          <a:prstGeom prst="line">
+            <a:avLst/>
+          </a:prstGeom>
+          <a:ln w="38100">
+            <a:solidFill>
+              <a:schemeClr val="bg2">
+                <a:lumMod val="50000"/>
+              </a:schemeClr>
+            </a:solidFill>
+          </a:ln>
+        </p:spPr>
+        <p:style>
+          <a:lnRef idx="2">
+            <a:schemeClr val="accent1"/>
+          </a:lnRef>
+          <a:fillRef idx="0">
+            <a:schemeClr val="accent1"/>
+          </a:fillRef>
+          <a:effectRef idx="1">
+            <a:schemeClr val="accent1"/>
+          </a:effectRef>
+          <a:fontRef idx="minor">
+            <a:schemeClr val="tx1"/>
+          </a:fontRef>
+        </p:style>
+      </p:cxnSp>
+      <p:cxnSp>
+        <p:nvCxnSpPr>
+          <p:cNvPr id="39" name="Straight Connector 38">
+            <a:extLst>
+              <a:ext uri="{FF2B5EF4-FFF2-40B4-BE49-F238E27FC236}">
+                <a16:creationId xmlns:a16="http://schemas.microsoft.com/office/drawing/2014/main" id="{ACEA7022-BB80-3CC4-81F1-F2DE9887A847}"/>
+              </a:ext>
+            </a:extLst>
+          </p:cNvPr>
+          <p:cNvCxnSpPr>
+            <a:cxnSpLocks/>
+          </p:cNvCxnSpPr>
+          <p:nvPr/>
+        </p:nvCxnSpPr>
+        <p:spPr>
+          <a:xfrm flipH="1" flipV="1">
+            <a:off x="4333407" y="3331073"/>
+            <a:ext cx="552283" cy="56072"/>
+          </a:xfrm>
+          <a:prstGeom prst="line">
+            <a:avLst/>
+          </a:prstGeom>
+          <a:ln w="38100">
+            <a:solidFill>
+              <a:schemeClr val="bg2">
+                <a:lumMod val="50000"/>
+              </a:schemeClr>
+            </a:solidFill>
+          </a:ln>
+        </p:spPr>
+        <p:style>
+          <a:lnRef idx="2">
+            <a:schemeClr val="accent1"/>
+          </a:lnRef>
+          <a:fillRef idx="0">
+            <a:schemeClr val="accent1"/>
+          </a:fillRef>
+          <a:effectRef idx="1">
+            <a:schemeClr val="accent1"/>
+          </a:effectRef>
+          <a:fontRef idx="minor">
+            <a:schemeClr val="tx1"/>
+          </a:fontRef>
+        </p:style>
+      </p:cxnSp>
+      <p:cxnSp>
+        <p:nvCxnSpPr>
+          <p:cNvPr id="40" name="Straight Connector 39">
+            <a:extLst>
+              <a:ext uri="{FF2B5EF4-FFF2-40B4-BE49-F238E27FC236}">
+                <a16:creationId xmlns:a16="http://schemas.microsoft.com/office/drawing/2014/main" id="{C8FE7E04-08F0-88EE-2D90-5B1B42DF89C4}"/>
+              </a:ext>
+            </a:extLst>
+          </p:cNvPr>
+          <p:cNvCxnSpPr>
+            <a:cxnSpLocks/>
+          </p:cNvCxnSpPr>
+          <p:nvPr/>
+        </p:nvCxnSpPr>
+        <p:spPr>
+          <a:xfrm flipH="1" flipV="1">
+            <a:off x="4648200" y="2613441"/>
+            <a:ext cx="400050" cy="397784"/>
+          </a:xfrm>
+          <a:prstGeom prst="line">
+            <a:avLst/>
+          </a:prstGeom>
+          <a:ln w="38100">
+            <a:solidFill>
+              <a:schemeClr val="bg2">
+                <a:lumMod val="50000"/>
+              </a:schemeClr>
+            </a:solidFill>
+          </a:ln>
+        </p:spPr>
+        <p:style>
+          <a:lnRef idx="2">
+            <a:schemeClr val="accent1"/>
+          </a:lnRef>
+          <a:fillRef idx="0">
+            <a:schemeClr val="accent1"/>
+          </a:fillRef>
+          <a:effectRef idx="1">
+            <a:schemeClr val="accent1"/>
+          </a:effectRef>
+          <a:fontRef idx="minor">
+            <a:schemeClr val="tx1"/>
+          </a:fontRef>
+        </p:style>
+      </p:cxnSp>
+      <p:cxnSp>
+        <p:nvCxnSpPr>
+          <p:cNvPr id="41" name="Straight Connector 40">
+            <a:extLst>
+              <a:ext uri="{FF2B5EF4-FFF2-40B4-BE49-F238E27FC236}">
+                <a16:creationId xmlns:a16="http://schemas.microsoft.com/office/drawing/2014/main" id="{D31CE1FA-8766-EED4-50D9-437E035B01FA}"/>
+              </a:ext>
+            </a:extLst>
+          </p:cNvPr>
+          <p:cNvCxnSpPr>
+            <a:cxnSpLocks/>
+          </p:cNvCxnSpPr>
+          <p:nvPr/>
+        </p:nvCxnSpPr>
+        <p:spPr>
+          <a:xfrm flipH="1" flipV="1">
+            <a:off x="4961835" y="2283462"/>
+            <a:ext cx="325175" cy="575363"/>
+          </a:xfrm>
+          <a:prstGeom prst="line">
+            <a:avLst/>
+          </a:prstGeom>
+          <a:ln w="38100">
+            <a:solidFill>
+              <a:schemeClr val="bg2">
+                <a:lumMod val="50000"/>
+              </a:schemeClr>
+            </a:solidFill>
+          </a:ln>
+        </p:spPr>
+        <p:style>
+          <a:lnRef idx="2">
+            <a:schemeClr val="accent1"/>
+          </a:lnRef>
+          <a:fillRef idx="0">
+            <a:schemeClr val="accent1"/>
+          </a:fillRef>
+          <a:effectRef idx="1">
+            <a:schemeClr val="accent1"/>
+          </a:effectRef>
+          <a:fontRef idx="minor">
+            <a:schemeClr val="tx1"/>
+          </a:fontRef>
+        </p:style>
+      </p:cxnSp>
+      <p:cxnSp>
+        <p:nvCxnSpPr>
+          <p:cNvPr id="42" name="Straight Connector 41">
+            <a:extLst>
+              <a:ext uri="{FF2B5EF4-FFF2-40B4-BE49-F238E27FC236}">
+                <a16:creationId xmlns:a16="http://schemas.microsoft.com/office/drawing/2014/main" id="{C1CFEF1C-5CC0-0958-8541-432F36986E4D}"/>
+              </a:ext>
+            </a:extLst>
+          </p:cNvPr>
+          <p:cNvCxnSpPr>
+            <a:cxnSpLocks/>
+          </p:cNvCxnSpPr>
+          <p:nvPr/>
+        </p:nvCxnSpPr>
+        <p:spPr>
+          <a:xfrm flipV="1">
+            <a:off x="5612627" y="2187989"/>
+            <a:ext cx="12203" cy="590772"/>
+          </a:xfrm>
+          <a:prstGeom prst="line">
+            <a:avLst/>
+          </a:prstGeom>
+          <a:ln w="38100">
+            <a:solidFill>
+              <a:schemeClr val="bg2">
+                <a:lumMod val="50000"/>
+              </a:schemeClr>
+            </a:solidFill>
+          </a:ln>
+        </p:spPr>
+        <p:style>
+          <a:lnRef idx="2">
+            <a:schemeClr val="accent1"/>
+          </a:lnRef>
+          <a:fillRef idx="0">
+            <a:schemeClr val="accent1"/>
+          </a:fillRef>
+          <a:effectRef idx="1">
+            <a:schemeClr val="accent1"/>
+          </a:effectRef>
+          <a:fontRef idx="minor">
+            <a:schemeClr val="tx1"/>
+          </a:fontRef>
+        </p:style>
+      </p:cxnSp>
+      <p:cxnSp>
+        <p:nvCxnSpPr>
+          <p:cNvPr id="43" name="Straight Connector 42">
+            <a:extLst>
+              <a:ext uri="{FF2B5EF4-FFF2-40B4-BE49-F238E27FC236}">
+                <a16:creationId xmlns:a16="http://schemas.microsoft.com/office/drawing/2014/main" id="{875660E5-8B8E-62D5-1342-D6ED98135B97}"/>
+              </a:ext>
+            </a:extLst>
+          </p:cNvPr>
+          <p:cNvCxnSpPr>
+            <a:cxnSpLocks/>
+          </p:cNvCxnSpPr>
+          <p:nvPr/>
+        </p:nvCxnSpPr>
+        <p:spPr>
+          <a:xfrm flipV="1">
+            <a:off x="5962650" y="2432878"/>
+            <a:ext cx="364683" cy="481827"/>
+          </a:xfrm>
+          <a:prstGeom prst="line">
+            <a:avLst/>
+          </a:prstGeom>
+          <a:ln w="38100">
+            <a:solidFill>
+              <a:schemeClr val="bg2">
+                <a:lumMod val="50000"/>
+              </a:schemeClr>
+            </a:solidFill>
+          </a:ln>
+        </p:spPr>
+        <p:style>
+          <a:lnRef idx="2">
+            <a:schemeClr val="accent1"/>
+          </a:lnRef>
+          <a:fillRef idx="0">
+            <a:schemeClr val="accent1"/>
+          </a:fillRef>
+          <a:effectRef idx="1">
+            <a:schemeClr val="accent1"/>
+          </a:effectRef>
+          <a:fontRef idx="minor">
+            <a:schemeClr val="tx1"/>
+          </a:fontRef>
+        </p:style>
+      </p:cxnSp>
+      <p:sp>
+        <p:nvSpPr>
+          <p:cNvPr id="54" name="TextBox 53">
+            <a:extLst>
+              <a:ext uri="{FF2B5EF4-FFF2-40B4-BE49-F238E27FC236}">
+                <a16:creationId xmlns:a16="http://schemas.microsoft.com/office/drawing/2014/main" id="{3E54B227-5093-E486-AE57-90526636EB1C}"/>
+              </a:ext>
+            </a:extLst>
+          </p:cNvPr>
+          <p:cNvSpPr txBox="1"/>
+          <p:nvPr/>
+        </p:nvSpPr>
+        <p:spPr>
+          <a:xfrm>
+            <a:off x="4360214" y="3612091"/>
+            <a:ext cx="477962" cy="284886"/>
+          </a:xfrm>
+          <a:prstGeom prst="rect">
+            <a:avLst/>
+          </a:prstGeom>
+          <a:noFill/>
+        </p:spPr>
+        <p:txBody>
+          <a:bodyPr wrap="square">
+            <a:spAutoFit/>
+          </a:bodyPr>
+          <a:lstStyle/>
+          <a:p>
+            <a:pPr>
+              <a:lnSpc>
+                <a:spcPts val="1425"/>
+              </a:lnSpc>
+            </a:pPr>
+            <a:r>
+              <a:rPr lang="en-US" b="0" dirty="0">
+                <a:solidFill>
+                  <a:srgbClr val="A31515"/>
+                </a:solidFill>
+                <a:effectLst/>
+                <a:latin typeface="Consolas" panose="020B0609020204030204" pitchFamily="49" charset="0"/>
+              </a:rPr>
+              <a:t>♈</a:t>
+            </a:r>
+            <a:endParaRPr lang="en-US" b="0" dirty="0">
+              <a:solidFill>
+                <a:srgbClr val="3B3B3B"/>
+              </a:solidFill>
+              <a:effectLst/>
+              <a:latin typeface="Consolas" panose="020B0609020204030204" pitchFamily="49" charset="0"/>
+            </a:endParaRPr>
+          </a:p>
+        </p:txBody>
+      </p:sp>
+      <p:sp>
+        <p:nvSpPr>
+          <p:cNvPr id="56" name="TextBox 55">
+            <a:extLst>
+              <a:ext uri="{FF2B5EF4-FFF2-40B4-BE49-F238E27FC236}">
+                <a16:creationId xmlns:a16="http://schemas.microsoft.com/office/drawing/2014/main" id="{E35BAC3C-98A9-2D97-49D2-A9CBAB9174F2}"/>
+              </a:ext>
+            </a:extLst>
+          </p:cNvPr>
+          <p:cNvSpPr txBox="1"/>
+          <p:nvPr/>
+        </p:nvSpPr>
+        <p:spPr>
+          <a:xfrm>
+            <a:off x="4684119" y="4088995"/>
+            <a:ext cx="477962" cy="284886"/>
+          </a:xfrm>
+          <a:prstGeom prst="rect">
+            <a:avLst/>
+          </a:prstGeom>
+          <a:noFill/>
+        </p:spPr>
+        <p:txBody>
+          <a:bodyPr wrap="square">
+            <a:spAutoFit/>
+          </a:bodyPr>
+          <a:lstStyle/>
+          <a:p>
+            <a:pPr>
+              <a:lnSpc>
+                <a:spcPts val="1425"/>
+              </a:lnSpc>
+            </a:pPr>
+            <a:r>
+              <a:rPr lang="en-US" b="0" dirty="0">
+                <a:solidFill>
+                  <a:srgbClr val="A31515"/>
+                </a:solidFill>
+                <a:effectLst/>
+                <a:latin typeface="Consolas" panose="020B0609020204030204" pitchFamily="49" charset="0"/>
+              </a:rPr>
+              <a:t>♈</a:t>
+            </a:r>
+            <a:endParaRPr lang="en-US" b="0" dirty="0">
+              <a:solidFill>
+                <a:srgbClr val="3B3B3B"/>
+              </a:solidFill>
+              <a:effectLst/>
+              <a:latin typeface="Consolas" panose="020B0609020204030204" pitchFamily="49" charset="0"/>
+            </a:endParaRPr>
+          </a:p>
+        </p:txBody>
+      </p:sp>
+      <p:sp>
+        <p:nvSpPr>
+          <p:cNvPr id="57" name="TextBox 56">
+            <a:extLst>
+              <a:ext uri="{FF2B5EF4-FFF2-40B4-BE49-F238E27FC236}">
+                <a16:creationId xmlns:a16="http://schemas.microsoft.com/office/drawing/2014/main" id="{8737C7EA-214F-0ADF-07BF-46D77F5931AD}"/>
+              </a:ext>
+            </a:extLst>
+          </p:cNvPr>
+          <p:cNvSpPr txBox="1"/>
+          <p:nvPr/>
+        </p:nvSpPr>
+        <p:spPr>
+          <a:xfrm>
+            <a:off x="5075043" y="4314851"/>
+            <a:ext cx="477962" cy="284886"/>
+          </a:xfrm>
+          <a:prstGeom prst="rect">
+            <a:avLst/>
+          </a:prstGeom>
+          <a:noFill/>
+        </p:spPr>
+        <p:txBody>
+          <a:bodyPr wrap="square">
+            <a:spAutoFit/>
+          </a:bodyPr>
+          <a:lstStyle/>
+          <a:p>
+            <a:pPr>
+              <a:lnSpc>
+                <a:spcPts val="1425"/>
+              </a:lnSpc>
+            </a:pPr>
+            <a:r>
+              <a:rPr lang="en-US" b="0" dirty="0">
+                <a:solidFill>
+                  <a:srgbClr val="A31515"/>
+                </a:solidFill>
+                <a:effectLst/>
+                <a:latin typeface="Consolas" panose="020B0609020204030204" pitchFamily="49" charset="0"/>
+              </a:rPr>
+              <a:t>♈</a:t>
+            </a:r>
+            <a:endParaRPr lang="en-US" b="0" dirty="0">
+              <a:solidFill>
+                <a:srgbClr val="3B3B3B"/>
+              </a:solidFill>
+              <a:effectLst/>
+              <a:latin typeface="Consolas" panose="020B0609020204030204" pitchFamily="49" charset="0"/>
+            </a:endParaRPr>
+          </a:p>
+        </p:txBody>
+      </p:sp>
+      <p:sp>
+        <p:nvSpPr>
+          <p:cNvPr id="58" name="TextBox 57">
+            <a:extLst>
+              <a:ext uri="{FF2B5EF4-FFF2-40B4-BE49-F238E27FC236}">
+                <a16:creationId xmlns:a16="http://schemas.microsoft.com/office/drawing/2014/main" id="{0CB99A24-5DBD-306C-D783-E3A237D82484}"/>
+              </a:ext>
+            </a:extLst>
+          </p:cNvPr>
+          <p:cNvSpPr txBox="1"/>
+          <p:nvPr/>
+        </p:nvSpPr>
+        <p:spPr>
+          <a:xfrm>
+            <a:off x="5560956" y="4331931"/>
+            <a:ext cx="477962" cy="284886"/>
+          </a:xfrm>
+          <a:prstGeom prst="rect">
+            <a:avLst/>
+          </a:prstGeom>
+          <a:noFill/>
+        </p:spPr>
+        <p:txBody>
+          <a:bodyPr wrap="square">
+            <a:spAutoFit/>
+          </a:bodyPr>
+          <a:lstStyle/>
+          <a:p>
+            <a:pPr>
+              <a:lnSpc>
+                <a:spcPts val="1425"/>
+              </a:lnSpc>
+            </a:pPr>
+            <a:r>
+              <a:rPr lang="en-US" b="0" dirty="0">
+                <a:solidFill>
+                  <a:srgbClr val="A31515"/>
+                </a:solidFill>
+                <a:effectLst/>
+                <a:latin typeface="Consolas" panose="020B0609020204030204" pitchFamily="49" charset="0"/>
+              </a:rPr>
+              <a:t>♈</a:t>
+            </a:r>
+            <a:endParaRPr lang="en-US" b="0" dirty="0">
+              <a:solidFill>
+                <a:srgbClr val="3B3B3B"/>
+              </a:solidFill>
+              <a:effectLst/>
+              <a:latin typeface="Consolas" panose="020B0609020204030204" pitchFamily="49" charset="0"/>
+            </a:endParaRPr>
+          </a:p>
+        </p:txBody>
+      </p:sp>
+      <p:sp>
+        <p:nvSpPr>
+          <p:cNvPr id="59" name="TextBox 58">
+            <a:extLst>
+              <a:ext uri="{FF2B5EF4-FFF2-40B4-BE49-F238E27FC236}">
+                <a16:creationId xmlns:a16="http://schemas.microsoft.com/office/drawing/2014/main" id="{AD9917BB-A0A9-0A20-5837-D83FA51C7AF4}"/>
+              </a:ext>
+            </a:extLst>
+          </p:cNvPr>
+          <p:cNvSpPr txBox="1"/>
+          <p:nvPr/>
+        </p:nvSpPr>
+        <p:spPr>
+          <a:xfrm>
+            <a:off x="6053606" y="4114395"/>
+            <a:ext cx="477962" cy="284886"/>
+          </a:xfrm>
+          <a:prstGeom prst="rect">
+            <a:avLst/>
+          </a:prstGeom>
+          <a:noFill/>
+        </p:spPr>
+        <p:txBody>
+          <a:bodyPr wrap="square">
+            <a:spAutoFit/>
+          </a:bodyPr>
+          <a:lstStyle/>
+          <a:p>
+            <a:pPr>
+              <a:lnSpc>
+                <a:spcPts val="1425"/>
+              </a:lnSpc>
+            </a:pPr>
+            <a:r>
+              <a:rPr lang="en-US" b="0" dirty="0">
+                <a:solidFill>
+                  <a:srgbClr val="A31515"/>
+                </a:solidFill>
+                <a:effectLst/>
+                <a:latin typeface="Consolas" panose="020B0609020204030204" pitchFamily="49" charset="0"/>
+              </a:rPr>
+              <a:t>♈</a:t>
+            </a:r>
+            <a:endParaRPr lang="en-US" b="0" dirty="0">
+              <a:solidFill>
+                <a:srgbClr val="3B3B3B"/>
+              </a:solidFill>
+              <a:effectLst/>
+              <a:latin typeface="Consolas" panose="020B0609020204030204" pitchFamily="49" charset="0"/>
+            </a:endParaRPr>
+          </a:p>
+        </p:txBody>
+      </p:sp>
+      <p:sp>
+        <p:nvSpPr>
+          <p:cNvPr id="60" name="TextBox 59">
+            <a:extLst>
+              <a:ext uri="{FF2B5EF4-FFF2-40B4-BE49-F238E27FC236}">
+                <a16:creationId xmlns:a16="http://schemas.microsoft.com/office/drawing/2014/main" id="{7E2886ED-008E-DC5C-79E3-EBB8933F5190}"/>
+              </a:ext>
+            </a:extLst>
+          </p:cNvPr>
+          <p:cNvSpPr txBox="1"/>
+          <p:nvPr/>
+        </p:nvSpPr>
+        <p:spPr>
+          <a:xfrm>
+            <a:off x="6303210" y="3689790"/>
+            <a:ext cx="477962" cy="284886"/>
+          </a:xfrm>
+          <a:prstGeom prst="rect">
+            <a:avLst/>
+          </a:prstGeom>
+          <a:noFill/>
+        </p:spPr>
+        <p:txBody>
+          <a:bodyPr wrap="square">
+            <a:spAutoFit/>
+          </a:bodyPr>
+          <a:lstStyle/>
+          <a:p>
+            <a:pPr>
+              <a:lnSpc>
+                <a:spcPts val="1425"/>
+              </a:lnSpc>
+            </a:pPr>
+            <a:r>
+              <a:rPr lang="en-US" b="0" dirty="0">
+                <a:solidFill>
+                  <a:srgbClr val="A31515"/>
+                </a:solidFill>
+                <a:effectLst/>
+                <a:latin typeface="Consolas" panose="020B0609020204030204" pitchFamily="49" charset="0"/>
+              </a:rPr>
+              <a:t>♈</a:t>
+            </a:r>
+            <a:endParaRPr lang="en-US" b="0" dirty="0">
+              <a:solidFill>
+                <a:srgbClr val="3B3B3B"/>
+              </a:solidFill>
+              <a:effectLst/>
+              <a:latin typeface="Consolas" panose="020B0609020204030204" pitchFamily="49" charset="0"/>
+            </a:endParaRPr>
+          </a:p>
+        </p:txBody>
+      </p:sp>
+      <p:sp>
+        <p:nvSpPr>
+          <p:cNvPr id="61" name="TextBox 60">
+            <a:extLst>
+              <a:ext uri="{FF2B5EF4-FFF2-40B4-BE49-F238E27FC236}">
+                <a16:creationId xmlns:a16="http://schemas.microsoft.com/office/drawing/2014/main" id="{1D5E312F-4FB1-9083-CA63-8FBF1172C840}"/>
+              </a:ext>
+            </a:extLst>
+          </p:cNvPr>
+          <p:cNvSpPr txBox="1"/>
+          <p:nvPr/>
+        </p:nvSpPr>
+        <p:spPr>
+          <a:xfrm>
+            <a:off x="6303210" y="3172716"/>
+            <a:ext cx="477962" cy="284886"/>
+          </a:xfrm>
+          <a:prstGeom prst="rect">
+            <a:avLst/>
+          </a:prstGeom>
+          <a:noFill/>
+        </p:spPr>
+        <p:txBody>
+          <a:bodyPr wrap="square">
+            <a:spAutoFit/>
+          </a:bodyPr>
+          <a:lstStyle/>
+          <a:p>
+            <a:pPr>
+              <a:lnSpc>
+                <a:spcPts val="1425"/>
+              </a:lnSpc>
+            </a:pPr>
+            <a:r>
+              <a:rPr lang="en-US" b="0" dirty="0">
+                <a:solidFill>
+                  <a:srgbClr val="A31515"/>
+                </a:solidFill>
+                <a:effectLst/>
+                <a:latin typeface="Consolas" panose="020B0609020204030204" pitchFamily="49" charset="0"/>
+              </a:rPr>
+              <a:t>♈</a:t>
+            </a:r>
+            <a:endParaRPr lang="en-US" b="0" dirty="0">
+              <a:solidFill>
+                <a:srgbClr val="3B3B3B"/>
+              </a:solidFill>
+              <a:effectLst/>
+              <a:latin typeface="Consolas" panose="020B0609020204030204" pitchFamily="49" charset="0"/>
+            </a:endParaRPr>
+          </a:p>
+        </p:txBody>
+      </p:sp>
+      <p:sp>
+        <p:nvSpPr>
+          <p:cNvPr id="62" name="TextBox 61">
+            <a:extLst>
+              <a:ext uri="{FF2B5EF4-FFF2-40B4-BE49-F238E27FC236}">
+                <a16:creationId xmlns:a16="http://schemas.microsoft.com/office/drawing/2014/main" id="{9DF1CB20-9788-B518-865E-C2C171A4CD17}"/>
+              </a:ext>
+            </a:extLst>
+          </p:cNvPr>
+          <p:cNvSpPr txBox="1"/>
+          <p:nvPr/>
+        </p:nvSpPr>
+        <p:spPr>
+          <a:xfrm>
+            <a:off x="6103013" y="2711328"/>
+            <a:ext cx="477962" cy="284886"/>
+          </a:xfrm>
+          <a:prstGeom prst="rect">
+            <a:avLst/>
+          </a:prstGeom>
+          <a:noFill/>
+        </p:spPr>
+        <p:txBody>
+          <a:bodyPr wrap="square">
+            <a:spAutoFit/>
+          </a:bodyPr>
+          <a:lstStyle/>
+          <a:p>
+            <a:pPr>
+              <a:lnSpc>
+                <a:spcPts val="1425"/>
+              </a:lnSpc>
+            </a:pPr>
+            <a:r>
+              <a:rPr lang="en-US" b="0" dirty="0">
+                <a:solidFill>
+                  <a:srgbClr val="A31515"/>
+                </a:solidFill>
+                <a:effectLst/>
+                <a:latin typeface="Consolas" panose="020B0609020204030204" pitchFamily="49" charset="0"/>
+              </a:rPr>
+              <a:t>♈</a:t>
+            </a:r>
+            <a:endParaRPr lang="en-US" b="0" dirty="0">
+              <a:solidFill>
+                <a:srgbClr val="3B3B3B"/>
+              </a:solidFill>
+              <a:effectLst/>
+              <a:latin typeface="Consolas" panose="020B0609020204030204" pitchFamily="49" charset="0"/>
+            </a:endParaRPr>
+          </a:p>
+        </p:txBody>
+      </p:sp>
+      <p:sp>
+        <p:nvSpPr>
+          <p:cNvPr id="63" name="TextBox 62">
+            <a:extLst>
+              <a:ext uri="{FF2B5EF4-FFF2-40B4-BE49-F238E27FC236}">
+                <a16:creationId xmlns:a16="http://schemas.microsoft.com/office/drawing/2014/main" id="{FDEB8276-ABF5-C92E-B0C6-851C12FBA4D8}"/>
+              </a:ext>
+            </a:extLst>
+          </p:cNvPr>
+          <p:cNvSpPr txBox="1"/>
+          <p:nvPr/>
+        </p:nvSpPr>
+        <p:spPr>
+          <a:xfrm>
+            <a:off x="5662184" y="2392426"/>
+            <a:ext cx="477962" cy="284886"/>
+          </a:xfrm>
+          <a:prstGeom prst="rect">
+            <a:avLst/>
+          </a:prstGeom>
+          <a:noFill/>
+        </p:spPr>
+        <p:txBody>
+          <a:bodyPr wrap="square">
+            <a:spAutoFit/>
+          </a:bodyPr>
+          <a:lstStyle/>
+          <a:p>
+            <a:pPr>
+              <a:lnSpc>
+                <a:spcPts val="1425"/>
+              </a:lnSpc>
+            </a:pPr>
+            <a:r>
+              <a:rPr lang="en-US" b="0" dirty="0">
+                <a:solidFill>
+                  <a:srgbClr val="A31515"/>
+                </a:solidFill>
+                <a:effectLst/>
+                <a:latin typeface="Consolas" panose="020B0609020204030204" pitchFamily="49" charset="0"/>
+              </a:rPr>
+              <a:t>♈</a:t>
+            </a:r>
+            <a:endParaRPr lang="en-US" b="0" dirty="0">
+              <a:solidFill>
+                <a:srgbClr val="3B3B3B"/>
+              </a:solidFill>
+              <a:effectLst/>
+              <a:latin typeface="Consolas" panose="020B0609020204030204" pitchFamily="49" charset="0"/>
+            </a:endParaRPr>
+          </a:p>
+        </p:txBody>
+      </p:sp>
+      <p:sp>
+        <p:nvSpPr>
+          <p:cNvPr id="64" name="TextBox 63">
+            <a:extLst>
+              <a:ext uri="{FF2B5EF4-FFF2-40B4-BE49-F238E27FC236}">
+                <a16:creationId xmlns:a16="http://schemas.microsoft.com/office/drawing/2014/main" id="{DBE01BD7-37D6-68C0-09C6-0E7DFE72563C}"/>
+              </a:ext>
+            </a:extLst>
+          </p:cNvPr>
+          <p:cNvSpPr txBox="1"/>
+          <p:nvPr/>
+        </p:nvSpPr>
+        <p:spPr>
+          <a:xfrm>
+            <a:off x="5106007" y="2420419"/>
+            <a:ext cx="477962" cy="284886"/>
+          </a:xfrm>
+          <a:prstGeom prst="rect">
+            <a:avLst/>
+          </a:prstGeom>
+          <a:noFill/>
+        </p:spPr>
+        <p:txBody>
+          <a:bodyPr wrap="square">
+            <a:spAutoFit/>
+          </a:bodyPr>
+          <a:lstStyle/>
+          <a:p>
+            <a:pPr>
+              <a:lnSpc>
+                <a:spcPts val="1425"/>
+              </a:lnSpc>
+            </a:pPr>
+            <a:r>
+              <a:rPr lang="en-US" b="0" dirty="0">
+                <a:solidFill>
+                  <a:srgbClr val="A31515"/>
+                </a:solidFill>
+                <a:effectLst/>
+                <a:latin typeface="Consolas" panose="020B0609020204030204" pitchFamily="49" charset="0"/>
+              </a:rPr>
+              <a:t>♈</a:t>
+            </a:r>
+            <a:endParaRPr lang="en-US" b="0" dirty="0">
+              <a:solidFill>
+                <a:srgbClr val="3B3B3B"/>
+              </a:solidFill>
+              <a:effectLst/>
+              <a:latin typeface="Consolas" panose="020B0609020204030204" pitchFamily="49" charset="0"/>
+            </a:endParaRPr>
+          </a:p>
+        </p:txBody>
+      </p:sp>
+      <p:sp>
+        <p:nvSpPr>
+          <p:cNvPr id="65" name="TextBox 64">
+            <a:extLst>
+              <a:ext uri="{FF2B5EF4-FFF2-40B4-BE49-F238E27FC236}">
+                <a16:creationId xmlns:a16="http://schemas.microsoft.com/office/drawing/2014/main" id="{EB8076F4-1DDC-2CA1-74D0-5277D9346655}"/>
+              </a:ext>
+            </a:extLst>
+          </p:cNvPr>
+          <p:cNvSpPr txBox="1"/>
+          <p:nvPr/>
+        </p:nvSpPr>
+        <p:spPr>
+          <a:xfrm>
+            <a:off x="4750132" y="2633757"/>
+            <a:ext cx="477962" cy="284886"/>
+          </a:xfrm>
+          <a:prstGeom prst="rect">
+            <a:avLst/>
+          </a:prstGeom>
+          <a:noFill/>
+        </p:spPr>
+        <p:txBody>
+          <a:bodyPr wrap="square">
+            <a:spAutoFit/>
+          </a:bodyPr>
+          <a:lstStyle/>
+          <a:p>
+            <a:pPr>
+              <a:lnSpc>
+                <a:spcPts val="1425"/>
+              </a:lnSpc>
+            </a:pPr>
+            <a:r>
+              <a:rPr lang="en-US" b="0" dirty="0">
+                <a:solidFill>
+                  <a:srgbClr val="A31515"/>
+                </a:solidFill>
+                <a:effectLst/>
+                <a:latin typeface="Consolas" panose="020B0609020204030204" pitchFamily="49" charset="0"/>
+              </a:rPr>
+              <a:t>♈</a:t>
+            </a:r>
+            <a:endParaRPr lang="en-US" b="0" dirty="0">
+              <a:solidFill>
+                <a:srgbClr val="3B3B3B"/>
+              </a:solidFill>
+              <a:effectLst/>
+              <a:latin typeface="Consolas" panose="020B0609020204030204" pitchFamily="49" charset="0"/>
+            </a:endParaRPr>
+          </a:p>
+        </p:txBody>
+      </p:sp>
+      <p:sp>
+        <p:nvSpPr>
+          <p:cNvPr id="66" name="TextBox 65">
+            <a:extLst>
+              <a:ext uri="{FF2B5EF4-FFF2-40B4-BE49-F238E27FC236}">
+                <a16:creationId xmlns:a16="http://schemas.microsoft.com/office/drawing/2014/main" id="{40D80BAA-7286-3C25-26E6-05AFAB59D052}"/>
+              </a:ext>
+            </a:extLst>
+          </p:cNvPr>
+          <p:cNvSpPr txBox="1"/>
+          <p:nvPr/>
+        </p:nvSpPr>
+        <p:spPr>
+          <a:xfrm>
+            <a:off x="4499377" y="2995341"/>
+            <a:ext cx="477962" cy="284886"/>
+          </a:xfrm>
+          <a:prstGeom prst="rect">
+            <a:avLst/>
+          </a:prstGeom>
+          <a:noFill/>
+        </p:spPr>
+        <p:txBody>
+          <a:bodyPr wrap="square">
+            <a:spAutoFit/>
+          </a:bodyPr>
+          <a:lstStyle/>
+          <a:p>
+            <a:pPr>
+              <a:lnSpc>
+                <a:spcPts val="1425"/>
+              </a:lnSpc>
+            </a:pPr>
+            <a:r>
+              <a:rPr lang="en-US" b="0" dirty="0">
+                <a:solidFill>
+                  <a:srgbClr val="A31515"/>
+                </a:solidFill>
+                <a:effectLst/>
+                <a:latin typeface="Consolas" panose="020B0609020204030204" pitchFamily="49" charset="0"/>
+              </a:rPr>
+              <a:t>♈</a:t>
+            </a:r>
+            <a:endParaRPr lang="en-US" b="0" dirty="0">
+              <a:solidFill>
+                <a:srgbClr val="3B3B3B"/>
+              </a:solidFill>
+              <a:effectLst/>
+              <a:latin typeface="Consolas" panose="020B0609020204030204" pitchFamily="49" charset="0"/>
+            </a:endParaRPr>
+          </a:p>
+        </p:txBody>
+      </p:sp>
+    </p:spTree>
+    <p:extLst>
+      <p:ext uri="{BB962C8B-B14F-4D97-AF65-F5344CB8AC3E}">
+        <p14:creationId xmlns:p14="http://schemas.microsoft.com/office/powerpoint/2010/main" val="2371161536"/>
+      </p:ext>
+    </p:extLst>
+  </p:cSld>
+  <p:clrMapOvr>
+    <a:masterClrMapping/>
+  </p:clrMapOvr>
+</p:sld>
+</file>
+
 <file path=ppt/theme/theme1.xml><?xml version="1.0" encoding="utf-8"?>
 <a:theme xmlns:a="http://schemas.openxmlformats.org/drawingml/2006/main" name="Office Theme">
   <a:themeElements>

</xml_diff>